<commit_message>
Design revised after discussion
</commit_message>
<xml_diff>
--- a/diagrams/MonitorMe_Design.pptx
+++ b/diagrams/MonitorMe_Design.pptx
@@ -107,6 +107,11 @@
       </a:defRPr>
     </a:lvl9pPr>
   </p:defaultTextStyle>
+  <p:extLst>
+    <p:ext uri="{EFAFB233-063F-42B5-8137-9DF3F51BA10A}">
+      <p15:sldGuideLst xmlns:p15="http://schemas.microsoft.com/office/powerpoint/2012/main"/>
+    </p:ext>
+  </p:extLst>
 </p:presentation>
 </file>
 
@@ -257,7 +262,7 @@
           <a:p>
             <a:fld id="{DC6A368C-0D68-4D55-B659-220BEA3BD029}" type="datetimeFigureOut">
               <a:rPr lang="de-DE" smtClean="0"/>
-              <a:t>18.02.2024</a:t>
+              <a:t>19.02.2024</a:t>
             </a:fld>
             <a:endParaRPr lang="de-DE"/>
           </a:p>
@@ -455,7 +460,7 @@
           <a:p>
             <a:fld id="{DC6A368C-0D68-4D55-B659-220BEA3BD029}" type="datetimeFigureOut">
               <a:rPr lang="de-DE" smtClean="0"/>
-              <a:t>18.02.2024</a:t>
+              <a:t>19.02.2024</a:t>
             </a:fld>
             <a:endParaRPr lang="de-DE"/>
           </a:p>
@@ -663,7 +668,7 @@
           <a:p>
             <a:fld id="{DC6A368C-0D68-4D55-B659-220BEA3BD029}" type="datetimeFigureOut">
               <a:rPr lang="de-DE" smtClean="0"/>
-              <a:t>18.02.2024</a:t>
+              <a:t>19.02.2024</a:t>
             </a:fld>
             <a:endParaRPr lang="de-DE"/>
           </a:p>
@@ -861,7 +866,7 @@
           <a:p>
             <a:fld id="{DC6A368C-0D68-4D55-B659-220BEA3BD029}" type="datetimeFigureOut">
               <a:rPr lang="de-DE" smtClean="0"/>
-              <a:t>18.02.2024</a:t>
+              <a:t>19.02.2024</a:t>
             </a:fld>
             <a:endParaRPr lang="de-DE"/>
           </a:p>
@@ -1136,7 +1141,7 @@
           <a:p>
             <a:fld id="{DC6A368C-0D68-4D55-B659-220BEA3BD029}" type="datetimeFigureOut">
               <a:rPr lang="de-DE" smtClean="0"/>
-              <a:t>18.02.2024</a:t>
+              <a:t>19.02.2024</a:t>
             </a:fld>
             <a:endParaRPr lang="de-DE"/>
           </a:p>
@@ -1401,7 +1406,7 @@
           <a:p>
             <a:fld id="{DC6A368C-0D68-4D55-B659-220BEA3BD029}" type="datetimeFigureOut">
               <a:rPr lang="de-DE" smtClean="0"/>
-              <a:t>18.02.2024</a:t>
+              <a:t>19.02.2024</a:t>
             </a:fld>
             <a:endParaRPr lang="de-DE"/>
           </a:p>
@@ -1813,7 +1818,7 @@
           <a:p>
             <a:fld id="{DC6A368C-0D68-4D55-B659-220BEA3BD029}" type="datetimeFigureOut">
               <a:rPr lang="de-DE" smtClean="0"/>
-              <a:t>18.02.2024</a:t>
+              <a:t>19.02.2024</a:t>
             </a:fld>
             <a:endParaRPr lang="de-DE"/>
           </a:p>
@@ -1954,7 +1959,7 @@
           <a:p>
             <a:fld id="{DC6A368C-0D68-4D55-B659-220BEA3BD029}" type="datetimeFigureOut">
               <a:rPr lang="de-DE" smtClean="0"/>
-              <a:t>18.02.2024</a:t>
+              <a:t>19.02.2024</a:t>
             </a:fld>
             <a:endParaRPr lang="de-DE"/>
           </a:p>
@@ -2067,7 +2072,7 @@
           <a:p>
             <a:fld id="{DC6A368C-0D68-4D55-B659-220BEA3BD029}" type="datetimeFigureOut">
               <a:rPr lang="de-DE" smtClean="0"/>
-              <a:t>18.02.2024</a:t>
+              <a:t>19.02.2024</a:t>
             </a:fld>
             <a:endParaRPr lang="de-DE"/>
           </a:p>
@@ -2378,7 +2383,7 @@
           <a:p>
             <a:fld id="{DC6A368C-0D68-4D55-B659-220BEA3BD029}" type="datetimeFigureOut">
               <a:rPr lang="de-DE" smtClean="0"/>
-              <a:t>18.02.2024</a:t>
+              <a:t>19.02.2024</a:t>
             </a:fld>
             <a:endParaRPr lang="de-DE"/>
           </a:p>
@@ -2666,7 +2671,7 @@
           <a:p>
             <a:fld id="{DC6A368C-0D68-4D55-B659-220BEA3BD029}" type="datetimeFigureOut">
               <a:rPr lang="de-DE" smtClean="0"/>
-              <a:t>18.02.2024</a:t>
+              <a:t>19.02.2024</a:t>
             </a:fld>
             <a:endParaRPr lang="de-DE"/>
           </a:p>
@@ -2907,7 +2912,7 @@
           <a:p>
             <a:fld id="{DC6A368C-0D68-4D55-B659-220BEA3BD029}" type="datetimeFigureOut">
               <a:rPr lang="de-DE" smtClean="0"/>
-              <a:t>18.02.2024</a:t>
+              <a:t>19.02.2024</a:t>
             </a:fld>
             <a:endParaRPr lang="de-DE"/>
           </a:p>
@@ -3769,6 +3774,13 @@
               <a:t> Dashboard</a:t>
             </a:r>
           </a:p>
+          <a:p>
+            <a:pPr algn="ctr"/>
+            <a:r>
+              <a:rPr lang="de-DE" dirty="0"/>
+              <a:t>(GUI)</a:t>
+            </a:r>
+          </a:p>
         </p:txBody>
       </p:sp>
       <p:cxnSp>
@@ -3828,7 +3840,7 @@
         </p:nvSpPr>
         <p:spPr>
           <a:xfrm>
-            <a:off x="5666494" y="3804121"/>
+            <a:off x="5914232" y="3895227"/>
             <a:ext cx="922047" cy="369332"/>
           </a:xfrm>
           <a:prstGeom prst="rect">
@@ -4301,7 +4313,7 @@
         </p:nvSpPr>
         <p:spPr>
           <a:xfrm>
-            <a:off x="7709539" y="4330466"/>
+            <a:off x="7742784" y="4096179"/>
             <a:ext cx="1570626" cy="1129100"/>
           </a:xfrm>
           <a:prstGeom prst="rect">
@@ -4388,7 +4400,7 @@
         </p:nvSpPr>
         <p:spPr>
           <a:xfrm>
-            <a:off x="10225265" y="4408515"/>
+            <a:off x="10105193" y="5525476"/>
             <a:ext cx="1667898" cy="976398"/>
           </a:xfrm>
           <a:prstGeom prst="rect">
@@ -4454,8 +4466,8 @@
         </p:nvCxnSpPr>
         <p:spPr>
           <a:xfrm flipV="1">
-            <a:off x="6706554" y="4895016"/>
-            <a:ext cx="1002985" cy="1119448"/>
+            <a:off x="6706554" y="4660729"/>
+            <a:ext cx="1036230" cy="1353735"/>
           </a:xfrm>
           <a:prstGeom prst="straightConnector1">
             <a:avLst/>
@@ -4491,14 +4503,14 @@
           <p:cNvCxnSpPr>
             <a:cxnSpLocks/>
             <a:stCxn id="99" idx="3"/>
-            <a:endCxn id="100" idx="1"/>
+            <a:endCxn id="4" idx="1"/>
           </p:cNvCxnSpPr>
           <p:nvPr/>
         </p:nvCxnSpPr>
         <p:spPr>
-          <a:xfrm>
-            <a:off x="9280165" y="4895016"/>
-            <a:ext cx="945100" cy="1698"/>
+          <a:xfrm flipV="1">
+            <a:off x="9313410" y="4072070"/>
+            <a:ext cx="694332" cy="588659"/>
           </a:xfrm>
           <a:prstGeom prst="straightConnector1">
             <a:avLst/>
@@ -4724,8 +4736,8 @@
         </p:nvCxnSpPr>
         <p:spPr>
           <a:xfrm flipV="1">
-            <a:off x="8494852" y="3701508"/>
-            <a:ext cx="0" cy="628958"/>
+            <a:off x="8528097" y="3701508"/>
+            <a:ext cx="34205" cy="394671"/>
           </a:xfrm>
           <a:prstGeom prst="straightConnector1">
             <a:avLst/>
@@ -4763,7 +4775,7 @@
         </p:nvSpPr>
         <p:spPr>
           <a:xfrm>
-            <a:off x="7767275" y="3123126"/>
+            <a:off x="7834725" y="3123126"/>
             <a:ext cx="1455154" cy="578382"/>
           </a:xfrm>
           <a:prstGeom prst="rect">
@@ -4824,15 +4836,15 @@
           </p:cNvPr>
           <p:cNvCxnSpPr>
             <a:cxnSpLocks/>
-            <a:stCxn id="120" idx="1"/>
-            <a:endCxn id="128" idx="0"/>
+            <a:stCxn id="128" idx="0"/>
+            <a:endCxn id="120" idx="1"/>
           </p:cNvCxnSpPr>
           <p:nvPr/>
         </p:nvCxnSpPr>
         <p:spPr>
-          <a:xfrm flipH="1">
-            <a:off x="8494852" y="2271660"/>
-            <a:ext cx="1093080" cy="851466"/>
+          <a:xfrm flipV="1">
+            <a:off x="8562302" y="2271660"/>
+            <a:ext cx="1025630" cy="851466"/>
           </a:xfrm>
           <a:prstGeom prst="straightConnector1">
             <a:avLst/>
@@ -5002,6 +5014,300 @@
           <a:xfrm flipH="1" flipV="1">
             <a:off x="3462348" y="4981606"/>
             <a:ext cx="2133210" cy="502506"/>
+          </a:xfrm>
+          <a:prstGeom prst="straightConnector1">
+            <a:avLst/>
+          </a:prstGeom>
+          <a:ln>
+            <a:tailEnd type="triangle"/>
+          </a:ln>
+        </p:spPr>
+        <p:style>
+          <a:lnRef idx="1">
+            <a:schemeClr val="accent1"/>
+          </a:lnRef>
+          <a:fillRef idx="0">
+            <a:schemeClr val="accent1"/>
+          </a:fillRef>
+          <a:effectRef idx="0">
+            <a:schemeClr val="accent1"/>
+          </a:effectRef>
+          <a:fontRef idx="minor">
+            <a:schemeClr val="tx1"/>
+          </a:fontRef>
+        </p:style>
+      </p:cxnSp>
+      <p:sp>
+        <p:nvSpPr>
+          <p:cNvPr id="4" name="Rechteck 3">
+            <a:extLst>
+              <a:ext uri="{FF2B5EF4-FFF2-40B4-BE49-F238E27FC236}">
+                <a16:creationId xmlns:a16="http://schemas.microsoft.com/office/drawing/2014/main" id="{74C57912-408F-2951-BB63-EB10E0C863AF}"/>
+              </a:ext>
+            </a:extLst>
+          </p:cNvPr>
+          <p:cNvSpPr/>
+          <p:nvPr/>
+        </p:nvSpPr>
+        <p:spPr>
+          <a:xfrm>
+            <a:off x="10007742" y="3507520"/>
+            <a:ext cx="1570626" cy="1129100"/>
+          </a:xfrm>
+          <a:prstGeom prst="rect">
+            <a:avLst/>
+          </a:prstGeom>
+        </p:spPr>
+        <p:style>
+          <a:lnRef idx="2">
+            <a:schemeClr val="accent6"/>
+          </a:lnRef>
+          <a:fillRef idx="1">
+            <a:schemeClr val="lt1"/>
+          </a:fillRef>
+          <a:effectRef idx="0">
+            <a:schemeClr val="accent6"/>
+          </a:effectRef>
+          <a:fontRef idx="minor">
+            <a:schemeClr val="dk1"/>
+          </a:fontRef>
+        </p:style>
+        <p:txBody>
+          <a:bodyPr rtlCol="0" anchor="ctr"/>
+          <a:lstStyle/>
+          <a:p>
+            <a:pPr algn="ctr"/>
+            <a:endParaRPr lang="de-DE" dirty="0"/>
+          </a:p>
+          <a:p>
+            <a:pPr algn="ctr"/>
+            <a:r>
+              <a:rPr lang="de-DE" dirty="0"/>
+              <a:t>Analyse </a:t>
+            </a:r>
+            <a:r>
+              <a:rPr lang="de-DE" dirty="0" err="1"/>
+              <a:t>rule</a:t>
+            </a:r>
+            <a:r>
+              <a:rPr lang="de-DE" dirty="0"/>
+              <a:t> </a:t>
+            </a:r>
+            <a:r>
+              <a:rPr lang="de-DE" dirty="0" err="1"/>
+              <a:t>builder</a:t>
+            </a:r>
+            <a:endParaRPr lang="de-DE" dirty="0"/>
+          </a:p>
+          <a:p>
+            <a:pPr algn="ctr"/>
+            <a:endParaRPr lang="de-DE" dirty="0"/>
+          </a:p>
+        </p:txBody>
+      </p:sp>
+      <p:cxnSp>
+        <p:nvCxnSpPr>
+          <p:cNvPr id="11" name="Gerade Verbindung mit Pfeil 10">
+            <a:extLst>
+              <a:ext uri="{FF2B5EF4-FFF2-40B4-BE49-F238E27FC236}">
+                <a16:creationId xmlns:a16="http://schemas.microsoft.com/office/drawing/2014/main" id="{A9E49C53-C5A9-467E-67F7-6636854599CA}"/>
+              </a:ext>
+            </a:extLst>
+          </p:cNvPr>
+          <p:cNvCxnSpPr>
+            <a:stCxn id="4" idx="2"/>
+            <a:endCxn id="100" idx="0"/>
+          </p:cNvCxnSpPr>
+          <p:nvPr/>
+        </p:nvCxnSpPr>
+        <p:spPr>
+          <a:xfrm>
+            <a:off x="10793055" y="4636620"/>
+            <a:ext cx="146087" cy="888856"/>
+          </a:xfrm>
+          <a:prstGeom prst="straightConnector1">
+            <a:avLst/>
+          </a:prstGeom>
+          <a:ln>
+            <a:tailEnd type="triangle"/>
+          </a:ln>
+        </p:spPr>
+        <p:style>
+          <a:lnRef idx="1">
+            <a:schemeClr val="accent1"/>
+          </a:lnRef>
+          <a:fillRef idx="0">
+            <a:schemeClr val="accent1"/>
+          </a:fillRef>
+          <a:effectRef idx="0">
+            <a:schemeClr val="accent1"/>
+          </a:effectRef>
+          <a:fontRef idx="minor">
+            <a:schemeClr val="tx1"/>
+          </a:fontRef>
+        </p:style>
+      </p:cxnSp>
+      <p:sp>
+        <p:nvSpPr>
+          <p:cNvPr id="25" name="Rechteck 24">
+            <a:extLst>
+              <a:ext uri="{FF2B5EF4-FFF2-40B4-BE49-F238E27FC236}">
+                <a16:creationId xmlns:a16="http://schemas.microsoft.com/office/drawing/2014/main" id="{DB001E16-7FA0-1572-6CF2-F4DA184A6FAF}"/>
+              </a:ext>
+            </a:extLst>
+          </p:cNvPr>
+          <p:cNvSpPr/>
+          <p:nvPr/>
+        </p:nvSpPr>
+        <p:spPr>
+          <a:xfrm>
+            <a:off x="8067462" y="5537806"/>
+            <a:ext cx="1570626" cy="1129100"/>
+          </a:xfrm>
+          <a:prstGeom prst="rect">
+            <a:avLst/>
+          </a:prstGeom>
+        </p:spPr>
+        <p:style>
+          <a:lnRef idx="2">
+            <a:schemeClr val="accent6"/>
+          </a:lnRef>
+          <a:fillRef idx="1">
+            <a:schemeClr val="lt1"/>
+          </a:fillRef>
+          <a:effectRef idx="0">
+            <a:schemeClr val="accent6"/>
+          </a:effectRef>
+          <a:fontRef idx="minor">
+            <a:schemeClr val="dk1"/>
+          </a:fontRef>
+        </p:style>
+        <p:txBody>
+          <a:bodyPr rtlCol="0" anchor="ctr"/>
+          <a:lstStyle/>
+          <a:p>
+            <a:pPr algn="ctr"/>
+            <a:endParaRPr lang="de-DE" dirty="0"/>
+          </a:p>
+          <a:p>
+            <a:pPr algn="ctr"/>
+            <a:r>
+              <a:rPr lang="de-DE" dirty="0"/>
+              <a:t>Analyse Data Dispatcher</a:t>
+            </a:r>
+          </a:p>
+          <a:p>
+            <a:pPr algn="ctr"/>
+            <a:endParaRPr lang="de-DE" dirty="0"/>
+          </a:p>
+        </p:txBody>
+      </p:sp>
+      <p:cxnSp>
+        <p:nvCxnSpPr>
+          <p:cNvPr id="27" name="Gerade Verbindung mit Pfeil 26">
+            <a:extLst>
+              <a:ext uri="{FF2B5EF4-FFF2-40B4-BE49-F238E27FC236}">
+                <a16:creationId xmlns:a16="http://schemas.microsoft.com/office/drawing/2014/main" id="{7CCD53F8-2E83-BCD6-8658-8D86E23998A0}"/>
+              </a:ext>
+            </a:extLst>
+          </p:cNvPr>
+          <p:cNvCxnSpPr>
+            <a:cxnSpLocks/>
+            <a:stCxn id="2" idx="3"/>
+            <a:endCxn id="25" idx="1"/>
+          </p:cNvCxnSpPr>
+          <p:nvPr/>
+        </p:nvCxnSpPr>
+        <p:spPr>
+          <a:xfrm>
+            <a:off x="6706554" y="6014464"/>
+            <a:ext cx="1360908" cy="87892"/>
+          </a:xfrm>
+          <a:prstGeom prst="straightConnector1">
+            <a:avLst/>
+          </a:prstGeom>
+          <a:ln>
+            <a:tailEnd type="triangle"/>
+          </a:ln>
+        </p:spPr>
+        <p:style>
+          <a:lnRef idx="1">
+            <a:schemeClr val="accent1"/>
+          </a:lnRef>
+          <a:fillRef idx="0">
+            <a:schemeClr val="accent1"/>
+          </a:fillRef>
+          <a:effectRef idx="0">
+            <a:schemeClr val="accent1"/>
+          </a:effectRef>
+          <a:fontRef idx="minor">
+            <a:schemeClr val="tx1"/>
+          </a:fontRef>
+        </p:style>
+      </p:cxnSp>
+      <p:cxnSp>
+        <p:nvCxnSpPr>
+          <p:cNvPr id="31" name="Gerade Verbindung mit Pfeil 30">
+            <a:extLst>
+              <a:ext uri="{FF2B5EF4-FFF2-40B4-BE49-F238E27FC236}">
+                <a16:creationId xmlns:a16="http://schemas.microsoft.com/office/drawing/2014/main" id="{950385C5-44ED-DEF4-FE54-33C1EA712C6B}"/>
+              </a:ext>
+            </a:extLst>
+          </p:cNvPr>
+          <p:cNvCxnSpPr>
+            <a:cxnSpLocks/>
+            <a:stCxn id="25" idx="3"/>
+            <a:endCxn id="100" idx="1"/>
+          </p:cNvCxnSpPr>
+          <p:nvPr/>
+        </p:nvCxnSpPr>
+        <p:spPr>
+          <a:xfrm flipV="1">
+            <a:off x="9638088" y="6013675"/>
+            <a:ext cx="467105" cy="88681"/>
+          </a:xfrm>
+          <a:prstGeom prst="straightConnector1">
+            <a:avLst/>
+          </a:prstGeom>
+          <a:ln>
+            <a:tailEnd type="triangle"/>
+          </a:ln>
+        </p:spPr>
+        <p:style>
+          <a:lnRef idx="1">
+            <a:schemeClr val="accent1"/>
+          </a:lnRef>
+          <a:fillRef idx="0">
+            <a:schemeClr val="accent1"/>
+          </a:fillRef>
+          <a:effectRef idx="0">
+            <a:schemeClr val="accent1"/>
+          </a:effectRef>
+          <a:fontRef idx="minor">
+            <a:schemeClr val="tx1"/>
+          </a:fontRef>
+        </p:style>
+      </p:cxnSp>
+      <p:cxnSp>
+        <p:nvCxnSpPr>
+          <p:cNvPr id="40" name="Gerade Verbindung mit Pfeil 39">
+            <a:extLst>
+              <a:ext uri="{FF2B5EF4-FFF2-40B4-BE49-F238E27FC236}">
+                <a16:creationId xmlns:a16="http://schemas.microsoft.com/office/drawing/2014/main" id="{9D77B0EB-5B98-D448-502D-160BE7972833}"/>
+              </a:ext>
+            </a:extLst>
+          </p:cNvPr>
+          <p:cNvCxnSpPr>
+            <a:cxnSpLocks/>
+            <a:stCxn id="128" idx="0"/>
+            <a:endCxn id="20" idx="3"/>
+          </p:cNvCxnSpPr>
+          <p:nvPr/>
+        </p:nvCxnSpPr>
+        <p:spPr>
+          <a:xfrm flipH="1" flipV="1">
+            <a:off x="7351196" y="2271659"/>
+            <a:ext cx="1211106" cy="851467"/>
           </a:xfrm>
           <a:prstGeom prst="straightConnector1">
             <a:avLst/>

</xml_diff>

<commit_message>
Introduced event driven component design
</commit_message>
<xml_diff>
--- a/diagrams/MonitorMe_Design.pptx
+++ b/diagrams/MonitorMe_Design.pptx
@@ -7,8 +7,9 @@
   <p:sldIdLst>
     <p:sldId id="257" r:id="rId2"/>
     <p:sldId id="259" r:id="rId3"/>
-    <p:sldId id="260" r:id="rId4"/>
-    <p:sldId id="258" r:id="rId5"/>
+    <p:sldId id="261" r:id="rId4"/>
+    <p:sldId id="260" r:id="rId5"/>
+    <p:sldId id="258" r:id="rId6"/>
   </p:sldIdLst>
   <p:sldSz cx="12192000" cy="6858000"/>
   <p:notesSz cx="6858000" cy="9144000"/>
@@ -5331,6 +5332,45 @@
           </a:fontRef>
         </p:style>
       </p:cxnSp>
+      <p:sp>
+        <p:nvSpPr>
+          <p:cNvPr id="5" name="Textfeld 4">
+            <a:extLst>
+              <a:ext uri="{FF2B5EF4-FFF2-40B4-BE49-F238E27FC236}">
+                <a16:creationId xmlns:a16="http://schemas.microsoft.com/office/drawing/2014/main" id="{3E02C6EF-4F27-AC70-7588-1D7D31C081B1}"/>
+              </a:ext>
+            </a:extLst>
+          </p:cNvPr>
+          <p:cNvSpPr txBox="1"/>
+          <p:nvPr/>
+        </p:nvSpPr>
+        <p:spPr>
+          <a:xfrm>
+            <a:off x="351536" y="298461"/>
+            <a:ext cx="2760436" cy="523220"/>
+          </a:xfrm>
+          <a:prstGeom prst="rect">
+            <a:avLst/>
+          </a:prstGeom>
+          <a:noFill/>
+        </p:spPr>
+        <p:txBody>
+          <a:bodyPr wrap="none" rtlCol="0">
+            <a:spAutoFit/>
+          </a:bodyPr>
+          <a:lstStyle/>
+          <a:p>
+            <a:r>
+              <a:rPr lang="de-DE" sz="2800" b="1" dirty="0" err="1"/>
+              <a:t>Component</a:t>
+            </a:r>
+            <a:r>
+              <a:rPr lang="de-DE" sz="2800" b="1" dirty="0"/>
+              <a:t> View</a:t>
+            </a:r>
+          </a:p>
+        </p:txBody>
+      </p:sp>
     </p:spTree>
     <p:extLst>
       <p:ext uri="{BB962C8B-B14F-4D97-AF65-F5344CB8AC3E}">
@@ -5361,6 +5401,2198 @@
           <a:chExt cx="0" cy="0"/>
         </a:xfrm>
       </p:grpSpPr>
+      <p:sp>
+        <p:nvSpPr>
+          <p:cNvPr id="2" name="Rechteck 1">
+            <a:extLst>
+              <a:ext uri="{FF2B5EF4-FFF2-40B4-BE49-F238E27FC236}">
+                <a16:creationId xmlns:a16="http://schemas.microsoft.com/office/drawing/2014/main" id="{DF61B2BE-10EE-FD73-0F29-8791845203B3}"/>
+              </a:ext>
+            </a:extLst>
+          </p:cNvPr>
+          <p:cNvSpPr/>
+          <p:nvPr/>
+        </p:nvSpPr>
+        <p:spPr>
+          <a:xfrm>
+            <a:off x="2445926" y="4983898"/>
+            <a:ext cx="1582643" cy="1120905"/>
+          </a:xfrm>
+          <a:prstGeom prst="rect">
+            <a:avLst/>
+          </a:prstGeom>
+          <a:solidFill>
+            <a:schemeClr val="bg2"/>
+          </a:solidFill>
+        </p:spPr>
+        <p:style>
+          <a:lnRef idx="2">
+            <a:schemeClr val="accent6"/>
+          </a:lnRef>
+          <a:fillRef idx="1">
+            <a:schemeClr val="lt1"/>
+          </a:fillRef>
+          <a:effectRef idx="0">
+            <a:schemeClr val="accent6"/>
+          </a:effectRef>
+          <a:fontRef idx="minor">
+            <a:schemeClr val="dk1"/>
+          </a:fontRef>
+        </p:style>
+        <p:txBody>
+          <a:bodyPr rtlCol="0" anchor="ctr"/>
+          <a:lstStyle/>
+          <a:p>
+            <a:pPr algn="ctr"/>
+            <a:r>
+              <a:rPr lang="de-DE" dirty="0"/>
+              <a:t>Vital Signal</a:t>
+            </a:r>
+          </a:p>
+          <a:p>
+            <a:pPr algn="ctr"/>
+            <a:r>
+              <a:rPr lang="de-DE" dirty="0"/>
+              <a:t>Event Channels</a:t>
+            </a:r>
+          </a:p>
+          <a:p>
+            <a:pPr algn="ctr"/>
+            <a:r>
+              <a:rPr lang="de-DE" sz="1200" dirty="0"/>
+              <a:t>(</a:t>
+            </a:r>
+            <a:r>
+              <a:rPr lang="de-DE" sz="1200" dirty="0" err="1"/>
+              <a:t>One</a:t>
+            </a:r>
+            <a:r>
+              <a:rPr lang="de-DE" sz="1200" dirty="0"/>
+              <a:t> Topic per Signal type)</a:t>
+            </a:r>
+          </a:p>
+        </p:txBody>
+      </p:sp>
+      <p:sp>
+        <p:nvSpPr>
+          <p:cNvPr id="3" name="Rechteck 2">
+            <a:extLst>
+              <a:ext uri="{FF2B5EF4-FFF2-40B4-BE49-F238E27FC236}">
+                <a16:creationId xmlns:a16="http://schemas.microsoft.com/office/drawing/2014/main" id="{9E1AB3BD-F2DB-0590-9182-1F335E43EC3C}"/>
+              </a:ext>
+            </a:extLst>
+          </p:cNvPr>
+          <p:cNvSpPr/>
+          <p:nvPr/>
+        </p:nvSpPr>
+        <p:spPr>
+          <a:xfrm>
+            <a:off x="208207" y="5129541"/>
+            <a:ext cx="1669185" cy="830934"/>
+          </a:xfrm>
+          <a:prstGeom prst="rect">
+            <a:avLst/>
+          </a:prstGeom>
+          <a:solidFill>
+            <a:schemeClr val="accent2"/>
+          </a:solidFill>
+        </p:spPr>
+        <p:style>
+          <a:lnRef idx="2">
+            <a:schemeClr val="accent6"/>
+          </a:lnRef>
+          <a:fillRef idx="1">
+            <a:schemeClr val="lt1"/>
+          </a:fillRef>
+          <a:effectRef idx="0">
+            <a:schemeClr val="accent6"/>
+          </a:effectRef>
+          <a:fontRef idx="minor">
+            <a:schemeClr val="dk1"/>
+          </a:fontRef>
+        </p:style>
+        <p:txBody>
+          <a:bodyPr rtlCol="0" anchor="ctr"/>
+          <a:lstStyle/>
+          <a:p>
+            <a:pPr algn="ctr"/>
+            <a:r>
+              <a:rPr lang="de-DE" dirty="0"/>
+              <a:t>vital </a:t>
+            </a:r>
+            <a:r>
+              <a:rPr lang="de-DE" dirty="0" err="1"/>
+              <a:t>signal</a:t>
+            </a:r>
+            <a:r>
+              <a:rPr lang="de-DE" dirty="0"/>
+              <a:t> </a:t>
+            </a:r>
+            <a:r>
+              <a:rPr lang="de-DE" dirty="0" err="1"/>
+              <a:t>input</a:t>
+            </a:r>
+            <a:r>
+              <a:rPr lang="de-DE" dirty="0"/>
+              <a:t> </a:t>
+            </a:r>
+            <a:r>
+              <a:rPr lang="de-DE" dirty="0" err="1"/>
+              <a:t>device</a:t>
+            </a:r>
+            <a:r>
+              <a:rPr lang="de-DE" dirty="0"/>
+              <a:t> </a:t>
+            </a:r>
+          </a:p>
+        </p:txBody>
+      </p:sp>
+      <p:sp>
+        <p:nvSpPr>
+          <p:cNvPr id="14" name="Rechteck 13">
+            <a:extLst>
+              <a:ext uri="{FF2B5EF4-FFF2-40B4-BE49-F238E27FC236}">
+                <a16:creationId xmlns:a16="http://schemas.microsoft.com/office/drawing/2014/main" id="{E6C25749-632B-AB75-2497-324CC79FEC29}"/>
+              </a:ext>
+            </a:extLst>
+          </p:cNvPr>
+          <p:cNvSpPr/>
+          <p:nvPr/>
+        </p:nvSpPr>
+        <p:spPr>
+          <a:xfrm>
+            <a:off x="208207" y="1701593"/>
+            <a:ext cx="1658432" cy="921044"/>
+          </a:xfrm>
+          <a:prstGeom prst="rect">
+            <a:avLst/>
+          </a:prstGeom>
+          <a:solidFill>
+            <a:schemeClr val="accent1">
+              <a:lumMod val="20000"/>
+              <a:lumOff val="80000"/>
+            </a:schemeClr>
+          </a:solidFill>
+          <a:ln>
+            <a:solidFill>
+              <a:schemeClr val="accent1">
+                <a:lumMod val="20000"/>
+                <a:lumOff val="80000"/>
+              </a:schemeClr>
+            </a:solidFill>
+          </a:ln>
+        </p:spPr>
+        <p:style>
+          <a:lnRef idx="2">
+            <a:schemeClr val="accent6"/>
+          </a:lnRef>
+          <a:fillRef idx="1">
+            <a:schemeClr val="lt1"/>
+          </a:fillRef>
+          <a:effectRef idx="0">
+            <a:schemeClr val="accent6"/>
+          </a:effectRef>
+          <a:fontRef idx="minor">
+            <a:schemeClr val="dk1"/>
+          </a:fontRef>
+        </p:style>
+        <p:txBody>
+          <a:bodyPr rtlCol="0" anchor="ctr"/>
+          <a:lstStyle/>
+          <a:p>
+            <a:pPr algn="ctr"/>
+            <a:r>
+              <a:rPr lang="de-DE" dirty="0" err="1"/>
+              <a:t>MyMedicalData</a:t>
+            </a:r>
+            <a:endParaRPr lang="de-DE" dirty="0"/>
+          </a:p>
+        </p:txBody>
+      </p:sp>
+      <p:sp>
+        <p:nvSpPr>
+          <p:cNvPr id="20" name="Rechteck 19">
+            <a:extLst>
+              <a:ext uri="{FF2B5EF4-FFF2-40B4-BE49-F238E27FC236}">
+                <a16:creationId xmlns:a16="http://schemas.microsoft.com/office/drawing/2014/main" id="{E5705C1D-A641-454A-5055-93E6E236A8B5}"/>
+              </a:ext>
+            </a:extLst>
+          </p:cNvPr>
+          <p:cNvSpPr/>
+          <p:nvPr/>
+        </p:nvSpPr>
+        <p:spPr>
+          <a:xfrm>
+            <a:off x="5129203" y="1741307"/>
+            <a:ext cx="2045103" cy="1000571"/>
+          </a:xfrm>
+          <a:prstGeom prst="rect">
+            <a:avLst/>
+          </a:prstGeom>
+          <a:solidFill>
+            <a:srgbClr val="92D050"/>
+          </a:solidFill>
+        </p:spPr>
+        <p:style>
+          <a:lnRef idx="2">
+            <a:schemeClr val="accent6"/>
+          </a:lnRef>
+          <a:fillRef idx="1">
+            <a:schemeClr val="lt1"/>
+          </a:fillRef>
+          <a:effectRef idx="0">
+            <a:schemeClr val="accent6"/>
+          </a:effectRef>
+          <a:fontRef idx="minor">
+            <a:schemeClr val="dk1"/>
+          </a:fontRef>
+        </p:style>
+        <p:txBody>
+          <a:bodyPr rtlCol="0" anchor="ctr"/>
+          <a:lstStyle/>
+          <a:p>
+            <a:pPr algn="ctr"/>
+            <a:r>
+              <a:rPr lang="de-DE" dirty="0" err="1"/>
+              <a:t>MonitorMe</a:t>
+            </a:r>
+            <a:r>
+              <a:rPr lang="de-DE" dirty="0"/>
+              <a:t> Dashboard</a:t>
+            </a:r>
+          </a:p>
+          <a:p>
+            <a:pPr algn="ctr"/>
+            <a:r>
+              <a:rPr lang="de-DE" dirty="0"/>
+              <a:t>(GUI)</a:t>
+            </a:r>
+          </a:p>
+        </p:txBody>
+      </p:sp>
+      <p:sp>
+        <p:nvSpPr>
+          <p:cNvPr id="30" name="Rechteck 29">
+            <a:extLst>
+              <a:ext uri="{FF2B5EF4-FFF2-40B4-BE49-F238E27FC236}">
+                <a16:creationId xmlns:a16="http://schemas.microsoft.com/office/drawing/2014/main" id="{89EBEC3B-FDF0-4F4A-0C41-A6571A8EC815}"/>
+              </a:ext>
+            </a:extLst>
+          </p:cNvPr>
+          <p:cNvSpPr/>
+          <p:nvPr/>
+        </p:nvSpPr>
+        <p:spPr>
+          <a:xfrm>
+            <a:off x="2918466" y="2079043"/>
+            <a:ext cx="1196458" cy="902931"/>
+          </a:xfrm>
+          <a:prstGeom prst="rect">
+            <a:avLst/>
+          </a:prstGeom>
+        </p:spPr>
+        <p:style>
+          <a:lnRef idx="2">
+            <a:schemeClr val="accent6"/>
+          </a:lnRef>
+          <a:fillRef idx="1">
+            <a:schemeClr val="lt1"/>
+          </a:fillRef>
+          <a:effectRef idx="0">
+            <a:schemeClr val="accent6"/>
+          </a:effectRef>
+          <a:fontRef idx="minor">
+            <a:schemeClr val="dk1"/>
+          </a:fontRef>
+        </p:style>
+        <p:txBody>
+          <a:bodyPr rtlCol="0" anchor="ctr"/>
+          <a:lstStyle/>
+          <a:p>
+            <a:pPr algn="ctr"/>
+            <a:r>
+              <a:rPr lang="de-DE" dirty="0" err="1"/>
+              <a:t>snapshot</a:t>
+            </a:r>
+            <a:r>
+              <a:rPr lang="de-DE" dirty="0"/>
+              <a:t> </a:t>
+            </a:r>
+            <a:r>
+              <a:rPr lang="de-DE" dirty="0" err="1"/>
+              <a:t>creator</a:t>
+            </a:r>
+            <a:r>
+              <a:rPr lang="de-DE" dirty="0"/>
+              <a:t> </a:t>
+            </a:r>
+          </a:p>
+        </p:txBody>
+      </p:sp>
+      <p:cxnSp>
+        <p:nvCxnSpPr>
+          <p:cNvPr id="39" name="Gerade Verbindung mit Pfeil 38">
+            <a:extLst>
+              <a:ext uri="{FF2B5EF4-FFF2-40B4-BE49-F238E27FC236}">
+                <a16:creationId xmlns:a16="http://schemas.microsoft.com/office/drawing/2014/main" id="{27281D07-FD2B-B217-DF99-33DDA37AC310}"/>
+              </a:ext>
+            </a:extLst>
+          </p:cNvPr>
+          <p:cNvCxnSpPr>
+            <a:cxnSpLocks/>
+            <a:stCxn id="30" idx="2"/>
+            <a:endCxn id="32" idx="1"/>
+          </p:cNvCxnSpPr>
+          <p:nvPr/>
+        </p:nvCxnSpPr>
+        <p:spPr>
+          <a:xfrm>
+            <a:off x="3516695" y="2981974"/>
+            <a:ext cx="1408658" cy="635608"/>
+          </a:xfrm>
+          <a:prstGeom prst="straightConnector1">
+            <a:avLst/>
+          </a:prstGeom>
+          <a:ln>
+            <a:tailEnd type="triangle"/>
+          </a:ln>
+        </p:spPr>
+        <p:style>
+          <a:lnRef idx="1">
+            <a:schemeClr val="accent1"/>
+          </a:lnRef>
+          <a:fillRef idx="0">
+            <a:schemeClr val="accent1"/>
+          </a:fillRef>
+          <a:effectRef idx="0">
+            <a:schemeClr val="accent1"/>
+          </a:effectRef>
+          <a:fontRef idx="minor">
+            <a:schemeClr val="tx1"/>
+          </a:fontRef>
+        </p:style>
+      </p:cxnSp>
+      <p:grpSp>
+        <p:nvGrpSpPr>
+          <p:cNvPr id="86" name="Gruppieren 85">
+            <a:extLst>
+              <a:ext uri="{FF2B5EF4-FFF2-40B4-BE49-F238E27FC236}">
+                <a16:creationId xmlns:a16="http://schemas.microsoft.com/office/drawing/2014/main" id="{55EAEEF7-71D8-7534-76BE-026760FEE35B}"/>
+              </a:ext>
+            </a:extLst>
+          </p:cNvPr>
+          <p:cNvGrpSpPr/>
+          <p:nvPr/>
+        </p:nvGrpSpPr>
+        <p:grpSpPr>
+          <a:xfrm>
+            <a:off x="310372" y="4068702"/>
+            <a:ext cx="793851" cy="915196"/>
+            <a:chOff x="277851" y="5063493"/>
+            <a:chExt cx="914400" cy="1294125"/>
+          </a:xfrm>
+        </p:grpSpPr>
+        <p:pic>
+          <p:nvPicPr>
+            <p:cNvPr id="78" name="Grafik 77" descr="Frau Silhouette">
+              <a:extLst>
+                <a:ext uri="{FF2B5EF4-FFF2-40B4-BE49-F238E27FC236}">
+                  <a16:creationId xmlns:a16="http://schemas.microsoft.com/office/drawing/2014/main" id="{FC6B48C9-FB18-0081-F66D-7FB26EFD629D}"/>
+                </a:ext>
+              </a:extLst>
+            </p:cNvPr>
+            <p:cNvPicPr>
+              <a:picLocks noChangeAspect="1"/>
+            </p:cNvPicPr>
+            <p:nvPr/>
+          </p:nvPicPr>
+          <p:blipFill>
+            <a:blip r:embed="rId2">
+              <a:extLst>
+                <a:ext uri="{28A0092B-C50C-407E-A947-70E740481C1C}">
+                  <a14:useLocalDpi xmlns:a14="http://schemas.microsoft.com/office/drawing/2010/main" val="0"/>
+                </a:ext>
+                <a:ext uri="{96DAC541-7B7A-43D3-8B79-37D633B846F1}">
+                  <asvg:svgBlip xmlns:asvg="http://schemas.microsoft.com/office/drawing/2016/SVG/main" r:embed="rId3"/>
+                </a:ext>
+              </a:extLst>
+            </a:blip>
+            <a:stretch>
+              <a:fillRect/>
+            </a:stretch>
+          </p:blipFill>
+          <p:spPr>
+            <a:xfrm>
+              <a:off x="277851" y="5443218"/>
+              <a:ext cx="914400" cy="914400"/>
+            </a:xfrm>
+            <a:prstGeom prst="rect">
+              <a:avLst/>
+            </a:prstGeom>
+          </p:spPr>
+        </p:pic>
+        <p:sp>
+          <p:nvSpPr>
+            <p:cNvPr id="80" name="Textfeld 79">
+              <a:extLst>
+                <a:ext uri="{FF2B5EF4-FFF2-40B4-BE49-F238E27FC236}">
+                  <a16:creationId xmlns:a16="http://schemas.microsoft.com/office/drawing/2014/main" id="{E442EC5E-F2A8-FEBB-9CA7-56A8589F2DB2}"/>
+                </a:ext>
+              </a:extLst>
+            </p:cNvPr>
+            <p:cNvSpPr txBox="1"/>
+            <p:nvPr/>
+          </p:nvSpPr>
+          <p:spPr>
+            <a:xfrm>
+              <a:off x="298512" y="5063493"/>
+              <a:ext cx="856901" cy="369332"/>
+            </a:xfrm>
+            <a:prstGeom prst="rect">
+              <a:avLst/>
+            </a:prstGeom>
+            <a:noFill/>
+          </p:spPr>
+          <p:txBody>
+            <a:bodyPr wrap="none" rtlCol="0">
+              <a:spAutoFit/>
+            </a:bodyPr>
+            <a:lstStyle/>
+            <a:p>
+              <a:r>
+                <a:rPr lang="de-DE" dirty="0" err="1"/>
+                <a:t>patient</a:t>
+              </a:r>
+              <a:endParaRPr lang="de-DE" dirty="0"/>
+            </a:p>
+          </p:txBody>
+        </p:sp>
+      </p:grpSp>
+      <p:grpSp>
+        <p:nvGrpSpPr>
+          <p:cNvPr id="85" name="Gruppieren 84">
+            <a:extLst>
+              <a:ext uri="{FF2B5EF4-FFF2-40B4-BE49-F238E27FC236}">
+                <a16:creationId xmlns:a16="http://schemas.microsoft.com/office/drawing/2014/main" id="{2389885F-C8EE-CB26-0844-AB95B34DEB3A}"/>
+              </a:ext>
+            </a:extLst>
+          </p:cNvPr>
+          <p:cNvGrpSpPr/>
+          <p:nvPr/>
+        </p:nvGrpSpPr>
+        <p:grpSpPr>
+          <a:xfrm>
+            <a:off x="5762933" y="0"/>
+            <a:ext cx="1014464" cy="1210955"/>
+            <a:chOff x="3032541" y="221552"/>
+            <a:chExt cx="1102209" cy="1283732"/>
+          </a:xfrm>
+        </p:grpSpPr>
+        <p:pic>
+          <p:nvPicPr>
+            <p:cNvPr id="77" name="Grafik 76" descr="Frau Silhouette">
+              <a:extLst>
+                <a:ext uri="{FF2B5EF4-FFF2-40B4-BE49-F238E27FC236}">
+                  <a16:creationId xmlns:a16="http://schemas.microsoft.com/office/drawing/2014/main" id="{D82D159B-BE39-667A-64AB-DF2B3AF2BD9A}"/>
+                </a:ext>
+              </a:extLst>
+            </p:cNvPr>
+            <p:cNvPicPr>
+              <a:picLocks noChangeAspect="1"/>
+            </p:cNvPicPr>
+            <p:nvPr/>
+          </p:nvPicPr>
+          <p:blipFill>
+            <a:blip r:embed="rId2">
+              <a:extLst>
+                <a:ext uri="{28A0092B-C50C-407E-A947-70E740481C1C}">
+                  <a14:useLocalDpi xmlns:a14="http://schemas.microsoft.com/office/drawing/2010/main" val="0"/>
+                </a:ext>
+                <a:ext uri="{96DAC541-7B7A-43D3-8B79-37D633B846F1}">
+                  <asvg:svgBlip xmlns:asvg="http://schemas.microsoft.com/office/drawing/2016/SVG/main" r:embed="rId3"/>
+                </a:ext>
+              </a:extLst>
+            </a:blip>
+            <a:stretch>
+              <a:fillRect/>
+            </a:stretch>
+          </p:blipFill>
+          <p:spPr>
+            <a:xfrm>
+              <a:off x="3032541" y="590884"/>
+              <a:ext cx="914400" cy="914400"/>
+            </a:xfrm>
+            <a:prstGeom prst="rect">
+              <a:avLst/>
+            </a:prstGeom>
+          </p:spPr>
+        </p:pic>
+        <p:sp>
+          <p:nvSpPr>
+            <p:cNvPr id="81" name="Textfeld 80">
+              <a:extLst>
+                <a:ext uri="{FF2B5EF4-FFF2-40B4-BE49-F238E27FC236}">
+                  <a16:creationId xmlns:a16="http://schemas.microsoft.com/office/drawing/2014/main" id="{849A4688-117C-5EB4-352E-231F68882D0C}"/>
+                </a:ext>
+              </a:extLst>
+            </p:cNvPr>
+            <p:cNvSpPr txBox="1"/>
+            <p:nvPr/>
+          </p:nvSpPr>
+          <p:spPr>
+            <a:xfrm>
+              <a:off x="3134925" y="221552"/>
+              <a:ext cx="999825" cy="369332"/>
+            </a:xfrm>
+            <a:prstGeom prst="rect">
+              <a:avLst/>
+            </a:prstGeom>
+            <a:noFill/>
+          </p:spPr>
+          <p:txBody>
+            <a:bodyPr wrap="none" rtlCol="0">
+              <a:spAutoFit/>
+            </a:bodyPr>
+            <a:lstStyle/>
+            <a:p>
+              <a:r>
+                <a:rPr lang="de-DE" dirty="0" err="1"/>
+                <a:t>personel</a:t>
+              </a:r>
+              <a:endParaRPr lang="de-DE" dirty="0"/>
+            </a:p>
+          </p:txBody>
+        </p:sp>
+      </p:grpSp>
+      <p:grpSp>
+        <p:nvGrpSpPr>
+          <p:cNvPr id="84" name="Gruppieren 83">
+            <a:extLst>
+              <a:ext uri="{FF2B5EF4-FFF2-40B4-BE49-F238E27FC236}">
+                <a16:creationId xmlns:a16="http://schemas.microsoft.com/office/drawing/2014/main" id="{E0FC8499-9D54-2100-65D0-01ABAE7D5B30}"/>
+              </a:ext>
+            </a:extLst>
+          </p:cNvPr>
+          <p:cNvGrpSpPr/>
+          <p:nvPr/>
+        </p:nvGrpSpPr>
+        <p:grpSpPr>
+          <a:xfrm>
+            <a:off x="10105193" y="48092"/>
+            <a:ext cx="841606" cy="1210955"/>
+            <a:chOff x="1054584" y="258481"/>
+            <a:chExt cx="914400" cy="1283732"/>
+          </a:xfrm>
+        </p:grpSpPr>
+        <p:pic>
+          <p:nvPicPr>
+            <p:cNvPr id="82" name="Grafik 81" descr="Frau Silhouette">
+              <a:extLst>
+                <a:ext uri="{FF2B5EF4-FFF2-40B4-BE49-F238E27FC236}">
+                  <a16:creationId xmlns:a16="http://schemas.microsoft.com/office/drawing/2014/main" id="{446DFEC3-84CA-5D2B-2164-A30ABB5E5D13}"/>
+                </a:ext>
+              </a:extLst>
+            </p:cNvPr>
+            <p:cNvPicPr>
+              <a:picLocks noChangeAspect="1"/>
+            </p:cNvPicPr>
+            <p:nvPr/>
+          </p:nvPicPr>
+          <p:blipFill>
+            <a:blip r:embed="rId2">
+              <a:extLst>
+                <a:ext uri="{28A0092B-C50C-407E-A947-70E740481C1C}">
+                  <a14:useLocalDpi xmlns:a14="http://schemas.microsoft.com/office/drawing/2010/main" val="0"/>
+                </a:ext>
+                <a:ext uri="{96DAC541-7B7A-43D3-8B79-37D633B846F1}">
+                  <asvg:svgBlip xmlns:asvg="http://schemas.microsoft.com/office/drawing/2016/SVG/main" r:embed="rId3"/>
+                </a:ext>
+              </a:extLst>
+            </a:blip>
+            <a:stretch>
+              <a:fillRect/>
+            </a:stretch>
+          </p:blipFill>
+          <p:spPr>
+            <a:xfrm>
+              <a:off x="1054584" y="627813"/>
+              <a:ext cx="914400" cy="914400"/>
+            </a:xfrm>
+            <a:prstGeom prst="rect">
+              <a:avLst/>
+            </a:prstGeom>
+          </p:spPr>
+        </p:pic>
+        <p:sp>
+          <p:nvSpPr>
+            <p:cNvPr id="83" name="Textfeld 82">
+              <a:extLst>
+                <a:ext uri="{FF2B5EF4-FFF2-40B4-BE49-F238E27FC236}">
+                  <a16:creationId xmlns:a16="http://schemas.microsoft.com/office/drawing/2014/main" id="{C2A61120-392D-8B36-2117-147ADEAC9B7D}"/>
+                </a:ext>
+              </a:extLst>
+            </p:cNvPr>
+            <p:cNvSpPr txBox="1"/>
+            <p:nvPr/>
+          </p:nvSpPr>
+          <p:spPr>
+            <a:xfrm>
+              <a:off x="1110392" y="258481"/>
+              <a:ext cx="858592" cy="369332"/>
+            </a:xfrm>
+            <a:prstGeom prst="rect">
+              <a:avLst/>
+            </a:prstGeom>
+            <a:noFill/>
+          </p:spPr>
+          <p:txBody>
+            <a:bodyPr wrap="square" rtlCol="0">
+              <a:spAutoFit/>
+            </a:bodyPr>
+            <a:lstStyle/>
+            <a:p>
+              <a:r>
+                <a:rPr lang="de-DE" dirty="0" err="1"/>
+                <a:t>doctor</a:t>
+              </a:r>
+              <a:endParaRPr lang="de-DE" dirty="0"/>
+            </a:p>
+          </p:txBody>
+        </p:sp>
+      </p:grpSp>
+      <p:sp>
+        <p:nvSpPr>
+          <p:cNvPr id="99" name="Rechteck 98">
+            <a:extLst>
+              <a:ext uri="{FF2B5EF4-FFF2-40B4-BE49-F238E27FC236}">
+                <a16:creationId xmlns:a16="http://schemas.microsoft.com/office/drawing/2014/main" id="{C2E457B5-E24B-874E-5C90-39C06FFA1406}"/>
+              </a:ext>
+            </a:extLst>
+          </p:cNvPr>
+          <p:cNvSpPr/>
+          <p:nvPr/>
+        </p:nvSpPr>
+        <p:spPr>
+          <a:xfrm>
+            <a:off x="7887575" y="4561596"/>
+            <a:ext cx="1445591" cy="664320"/>
+          </a:xfrm>
+          <a:prstGeom prst="rect">
+            <a:avLst/>
+          </a:prstGeom>
+        </p:spPr>
+        <p:style>
+          <a:lnRef idx="2">
+            <a:schemeClr val="accent6"/>
+          </a:lnRef>
+          <a:fillRef idx="1">
+            <a:schemeClr val="lt1"/>
+          </a:fillRef>
+          <a:effectRef idx="0">
+            <a:schemeClr val="accent6"/>
+          </a:effectRef>
+          <a:fontRef idx="minor">
+            <a:schemeClr val="dk1"/>
+          </a:fontRef>
+        </p:style>
+        <p:txBody>
+          <a:bodyPr rtlCol="0" anchor="ctr"/>
+          <a:lstStyle/>
+          <a:p>
+            <a:pPr algn="ctr"/>
+            <a:r>
+              <a:rPr lang="de-DE" dirty="0"/>
+              <a:t>Signal Analyzer</a:t>
+            </a:r>
+          </a:p>
+        </p:txBody>
+      </p:sp>
+      <p:sp>
+        <p:nvSpPr>
+          <p:cNvPr id="100" name="Rechteck 99">
+            <a:extLst>
+              <a:ext uri="{FF2B5EF4-FFF2-40B4-BE49-F238E27FC236}">
+                <a16:creationId xmlns:a16="http://schemas.microsoft.com/office/drawing/2014/main" id="{6EE9E339-CA94-DC42-DF32-CC56FCE6B26F}"/>
+              </a:ext>
+            </a:extLst>
+          </p:cNvPr>
+          <p:cNvSpPr/>
+          <p:nvPr/>
+        </p:nvSpPr>
+        <p:spPr>
+          <a:xfrm>
+            <a:off x="10007742" y="5138431"/>
+            <a:ext cx="1535119" cy="921044"/>
+          </a:xfrm>
+          <a:prstGeom prst="rect">
+            <a:avLst/>
+          </a:prstGeom>
+          <a:solidFill>
+            <a:schemeClr val="accent1">
+              <a:lumMod val="20000"/>
+              <a:lumOff val="80000"/>
+            </a:schemeClr>
+          </a:solidFill>
+          <a:ln>
+            <a:solidFill>
+              <a:schemeClr val="accent1">
+                <a:lumMod val="20000"/>
+                <a:lumOff val="80000"/>
+              </a:schemeClr>
+            </a:solidFill>
+          </a:ln>
+        </p:spPr>
+        <p:style>
+          <a:lnRef idx="2">
+            <a:schemeClr val="accent6"/>
+          </a:lnRef>
+          <a:fillRef idx="1">
+            <a:schemeClr val="lt1"/>
+          </a:fillRef>
+          <a:effectRef idx="0">
+            <a:schemeClr val="accent6"/>
+          </a:effectRef>
+          <a:fontRef idx="minor">
+            <a:schemeClr val="dk1"/>
+          </a:fontRef>
+        </p:style>
+        <p:txBody>
+          <a:bodyPr rtlCol="0" anchor="ctr"/>
+          <a:lstStyle/>
+          <a:p>
+            <a:pPr algn="ctr"/>
+            <a:r>
+              <a:rPr lang="de-DE" dirty="0" err="1"/>
+              <a:t>MonitorThem</a:t>
+            </a:r>
+            <a:endParaRPr lang="de-DE" dirty="0"/>
+          </a:p>
+        </p:txBody>
+      </p:sp>
+      <p:cxnSp>
+        <p:nvCxnSpPr>
+          <p:cNvPr id="108" name="Gerade Verbindung mit Pfeil 107">
+            <a:extLst>
+              <a:ext uri="{FF2B5EF4-FFF2-40B4-BE49-F238E27FC236}">
+                <a16:creationId xmlns:a16="http://schemas.microsoft.com/office/drawing/2014/main" id="{4C0A85DE-5AC6-F9AC-93A3-2C7C7B31BDED}"/>
+              </a:ext>
+            </a:extLst>
+          </p:cNvPr>
+          <p:cNvCxnSpPr>
+            <a:cxnSpLocks/>
+            <a:stCxn id="99" idx="3"/>
+            <a:endCxn id="4" idx="1"/>
+          </p:cNvCxnSpPr>
+          <p:nvPr/>
+        </p:nvCxnSpPr>
+        <p:spPr>
+          <a:xfrm flipV="1">
+            <a:off x="9333166" y="4040065"/>
+            <a:ext cx="674576" cy="853691"/>
+          </a:xfrm>
+          <a:prstGeom prst="straightConnector1">
+            <a:avLst/>
+          </a:prstGeom>
+          <a:ln>
+            <a:headEnd type="triangle"/>
+            <a:tailEnd type="triangle"/>
+          </a:ln>
+        </p:spPr>
+        <p:style>
+          <a:lnRef idx="1">
+            <a:schemeClr val="accent1"/>
+          </a:lnRef>
+          <a:fillRef idx="0">
+            <a:schemeClr val="accent1"/>
+          </a:fillRef>
+          <a:effectRef idx="0">
+            <a:schemeClr val="accent1"/>
+          </a:effectRef>
+          <a:fontRef idx="minor">
+            <a:schemeClr val="tx1"/>
+          </a:fontRef>
+        </p:style>
+      </p:cxnSp>
+      <p:sp>
+        <p:nvSpPr>
+          <p:cNvPr id="111" name="Flussdiagramm: Magnetplattenspeicher 110">
+            <a:extLst>
+              <a:ext uri="{FF2B5EF4-FFF2-40B4-BE49-F238E27FC236}">
+                <a16:creationId xmlns:a16="http://schemas.microsoft.com/office/drawing/2014/main" id="{28811D5D-9186-D661-CE29-25BE6045E408}"/>
+              </a:ext>
+            </a:extLst>
+          </p:cNvPr>
+          <p:cNvSpPr/>
+          <p:nvPr/>
+        </p:nvSpPr>
+        <p:spPr>
+          <a:xfrm>
+            <a:off x="6548808" y="3392528"/>
+            <a:ext cx="839489" cy="800568"/>
+          </a:xfrm>
+          <a:prstGeom prst="flowChartMagneticDisk">
+            <a:avLst/>
+          </a:prstGeom>
+        </p:spPr>
+        <p:style>
+          <a:lnRef idx="2">
+            <a:schemeClr val="accent6"/>
+          </a:lnRef>
+          <a:fillRef idx="1">
+            <a:schemeClr val="lt1"/>
+          </a:fillRef>
+          <a:effectRef idx="0">
+            <a:schemeClr val="accent6"/>
+          </a:effectRef>
+          <a:fontRef idx="minor">
+            <a:schemeClr val="dk1"/>
+          </a:fontRef>
+        </p:style>
+        <p:txBody>
+          <a:bodyPr rtlCol="0" anchor="ctr"/>
+          <a:lstStyle/>
+          <a:p>
+            <a:pPr algn="ctr"/>
+            <a:r>
+              <a:rPr lang="de-DE" sz="1600" dirty="0"/>
+              <a:t>Patient DB</a:t>
+            </a:r>
+          </a:p>
+        </p:txBody>
+      </p:sp>
+      <p:cxnSp>
+        <p:nvCxnSpPr>
+          <p:cNvPr id="113" name="Gerade Verbindung mit Pfeil 112">
+            <a:extLst>
+              <a:ext uri="{FF2B5EF4-FFF2-40B4-BE49-F238E27FC236}">
+                <a16:creationId xmlns:a16="http://schemas.microsoft.com/office/drawing/2014/main" id="{B9DDB9D9-904C-A342-BDED-46FFCA7EC044}"/>
+              </a:ext>
+            </a:extLst>
+          </p:cNvPr>
+          <p:cNvCxnSpPr>
+            <a:cxnSpLocks/>
+            <a:stCxn id="20" idx="2"/>
+            <a:endCxn id="111" idx="1"/>
+          </p:cNvCxnSpPr>
+          <p:nvPr/>
+        </p:nvCxnSpPr>
+        <p:spPr>
+          <a:xfrm>
+            <a:off x="6151755" y="2741878"/>
+            <a:ext cx="816798" cy="650650"/>
+          </a:xfrm>
+          <a:prstGeom prst="straightConnector1">
+            <a:avLst/>
+          </a:prstGeom>
+          <a:ln>
+            <a:tailEnd type="triangle"/>
+          </a:ln>
+        </p:spPr>
+        <p:style>
+          <a:lnRef idx="1">
+            <a:schemeClr val="accent1"/>
+          </a:lnRef>
+          <a:fillRef idx="0">
+            <a:schemeClr val="accent1"/>
+          </a:fillRef>
+          <a:effectRef idx="0">
+            <a:schemeClr val="accent1"/>
+          </a:effectRef>
+          <a:fontRef idx="minor">
+            <a:schemeClr val="tx1"/>
+          </a:fontRef>
+        </p:style>
+      </p:cxnSp>
+      <p:cxnSp>
+        <p:nvCxnSpPr>
+          <p:cNvPr id="115" name="Gerade Verbindung mit Pfeil 114">
+            <a:extLst>
+              <a:ext uri="{FF2B5EF4-FFF2-40B4-BE49-F238E27FC236}">
+                <a16:creationId xmlns:a16="http://schemas.microsoft.com/office/drawing/2014/main" id="{26C9E04E-1776-DAFD-56CF-29A409B21910}"/>
+              </a:ext>
+            </a:extLst>
+          </p:cNvPr>
+          <p:cNvCxnSpPr>
+            <a:cxnSpLocks/>
+            <a:stCxn id="77" idx="2"/>
+            <a:endCxn id="20" idx="0"/>
+          </p:cNvCxnSpPr>
+          <p:nvPr/>
+        </p:nvCxnSpPr>
+        <p:spPr>
+          <a:xfrm flipH="1">
+            <a:off x="6151755" y="1210955"/>
+            <a:ext cx="31981" cy="530352"/>
+          </a:xfrm>
+          <a:prstGeom prst="straightConnector1">
+            <a:avLst/>
+          </a:prstGeom>
+          <a:ln>
+            <a:tailEnd type="triangle"/>
+          </a:ln>
+        </p:spPr>
+        <p:style>
+          <a:lnRef idx="1">
+            <a:schemeClr val="accent1"/>
+          </a:lnRef>
+          <a:fillRef idx="0">
+            <a:schemeClr val="accent1"/>
+          </a:fillRef>
+          <a:effectRef idx="0">
+            <a:schemeClr val="accent1"/>
+          </a:effectRef>
+          <a:fontRef idx="minor">
+            <a:schemeClr val="tx1"/>
+          </a:fontRef>
+        </p:style>
+      </p:cxnSp>
+      <p:sp>
+        <p:nvSpPr>
+          <p:cNvPr id="120" name="Rechteck 119">
+            <a:extLst>
+              <a:ext uri="{FF2B5EF4-FFF2-40B4-BE49-F238E27FC236}">
+                <a16:creationId xmlns:a16="http://schemas.microsoft.com/office/drawing/2014/main" id="{71BFF247-C41F-1EEC-F8FA-509EA17EFEF2}"/>
+              </a:ext>
+            </a:extLst>
+          </p:cNvPr>
+          <p:cNvSpPr/>
+          <p:nvPr/>
+        </p:nvSpPr>
+        <p:spPr>
+          <a:xfrm>
+            <a:off x="9587933" y="1758090"/>
+            <a:ext cx="1761838" cy="968910"/>
+          </a:xfrm>
+          <a:prstGeom prst="rect">
+            <a:avLst/>
+          </a:prstGeom>
+          <a:solidFill>
+            <a:srgbClr val="92D050"/>
+          </a:solidFill>
+        </p:spPr>
+        <p:style>
+          <a:lnRef idx="2">
+            <a:schemeClr val="accent6"/>
+          </a:lnRef>
+          <a:fillRef idx="1">
+            <a:schemeClr val="lt1"/>
+          </a:fillRef>
+          <a:effectRef idx="0">
+            <a:schemeClr val="accent6"/>
+          </a:effectRef>
+          <a:fontRef idx="minor">
+            <a:schemeClr val="dk1"/>
+          </a:fontRef>
+        </p:style>
+        <p:txBody>
+          <a:bodyPr rtlCol="0" anchor="ctr"/>
+          <a:lstStyle/>
+          <a:p>
+            <a:pPr algn="ctr"/>
+            <a:r>
+              <a:rPr lang="de-DE" dirty="0" err="1"/>
+              <a:t>MonitorMe</a:t>
+            </a:r>
+            <a:r>
+              <a:rPr lang="de-DE" dirty="0"/>
+              <a:t> App</a:t>
+            </a:r>
+          </a:p>
+        </p:txBody>
+      </p:sp>
+      <p:cxnSp>
+        <p:nvCxnSpPr>
+          <p:cNvPr id="122" name="Gerade Verbindung mit Pfeil 121">
+            <a:extLst>
+              <a:ext uri="{FF2B5EF4-FFF2-40B4-BE49-F238E27FC236}">
+                <a16:creationId xmlns:a16="http://schemas.microsoft.com/office/drawing/2014/main" id="{1328A6A4-55FF-44D8-E4BF-0866B24CE1F5}"/>
+              </a:ext>
+            </a:extLst>
+          </p:cNvPr>
+          <p:cNvCxnSpPr>
+            <a:cxnSpLocks/>
+            <a:stCxn id="99" idx="0"/>
+            <a:endCxn id="128" idx="2"/>
+          </p:cNvCxnSpPr>
+          <p:nvPr/>
+        </p:nvCxnSpPr>
+        <p:spPr>
+          <a:xfrm flipH="1" flipV="1">
+            <a:off x="8599443" y="3752348"/>
+            <a:ext cx="10928" cy="809248"/>
+          </a:xfrm>
+          <a:prstGeom prst="straightConnector1">
+            <a:avLst/>
+          </a:prstGeom>
+          <a:ln>
+            <a:tailEnd type="triangle"/>
+          </a:ln>
+        </p:spPr>
+        <p:style>
+          <a:lnRef idx="1">
+            <a:schemeClr val="accent1"/>
+          </a:lnRef>
+          <a:fillRef idx="0">
+            <a:schemeClr val="accent1"/>
+          </a:fillRef>
+          <a:effectRef idx="0">
+            <a:schemeClr val="accent1"/>
+          </a:effectRef>
+          <a:fontRef idx="minor">
+            <a:schemeClr val="tx1"/>
+          </a:fontRef>
+        </p:style>
+      </p:cxnSp>
+      <p:sp>
+        <p:nvSpPr>
+          <p:cNvPr id="128" name="Rechteck 127">
+            <a:extLst>
+              <a:ext uri="{FF2B5EF4-FFF2-40B4-BE49-F238E27FC236}">
+                <a16:creationId xmlns:a16="http://schemas.microsoft.com/office/drawing/2014/main" id="{D781D453-BD77-CDE3-6713-E737326BD180}"/>
+              </a:ext>
+            </a:extLst>
+          </p:cNvPr>
+          <p:cNvSpPr/>
+          <p:nvPr/>
+        </p:nvSpPr>
+        <p:spPr>
+          <a:xfrm>
+            <a:off x="7750314" y="3129269"/>
+            <a:ext cx="1698257" cy="623079"/>
+          </a:xfrm>
+          <a:prstGeom prst="rect">
+            <a:avLst/>
+          </a:prstGeom>
+          <a:solidFill>
+            <a:schemeClr val="bg1">
+              <a:lumMod val="95000"/>
+            </a:schemeClr>
+          </a:solidFill>
+        </p:spPr>
+        <p:style>
+          <a:lnRef idx="2">
+            <a:schemeClr val="accent6"/>
+          </a:lnRef>
+          <a:fillRef idx="1">
+            <a:schemeClr val="lt1"/>
+          </a:fillRef>
+          <a:effectRef idx="0">
+            <a:schemeClr val="accent6"/>
+          </a:effectRef>
+          <a:fontRef idx="minor">
+            <a:schemeClr val="dk1"/>
+          </a:fontRef>
+        </p:style>
+        <p:txBody>
+          <a:bodyPr rtlCol="0" anchor="ctr"/>
+          <a:lstStyle/>
+          <a:p>
+            <a:pPr algn="ctr"/>
+            <a:endParaRPr lang="de-DE" dirty="0"/>
+          </a:p>
+          <a:p>
+            <a:pPr algn="ctr"/>
+            <a:r>
+              <a:rPr lang="de-DE" dirty="0" err="1"/>
+              <a:t>Notification</a:t>
+            </a:r>
+            <a:r>
+              <a:rPr lang="de-DE" dirty="0"/>
+              <a:t> Event Channel</a:t>
+            </a:r>
+            <a:endParaRPr lang="de-DE" sz="1200" dirty="0"/>
+          </a:p>
+          <a:p>
+            <a:pPr algn="ctr"/>
+            <a:endParaRPr lang="de-DE" dirty="0"/>
+          </a:p>
+        </p:txBody>
+      </p:sp>
+      <p:cxnSp>
+        <p:nvCxnSpPr>
+          <p:cNvPr id="161" name="Gerade Verbindung mit Pfeil 160">
+            <a:extLst>
+              <a:ext uri="{FF2B5EF4-FFF2-40B4-BE49-F238E27FC236}">
+                <a16:creationId xmlns:a16="http://schemas.microsoft.com/office/drawing/2014/main" id="{F9FA3A55-F317-8BDB-88E7-2D531E70D412}"/>
+              </a:ext>
+            </a:extLst>
+          </p:cNvPr>
+          <p:cNvCxnSpPr>
+            <a:cxnSpLocks/>
+            <a:stCxn id="128" idx="0"/>
+            <a:endCxn id="120" idx="1"/>
+          </p:cNvCxnSpPr>
+          <p:nvPr/>
+        </p:nvCxnSpPr>
+        <p:spPr>
+          <a:xfrm flipV="1">
+            <a:off x="8599443" y="2242545"/>
+            <a:ext cx="988490" cy="886724"/>
+          </a:xfrm>
+          <a:prstGeom prst="straightConnector1">
+            <a:avLst/>
+          </a:prstGeom>
+          <a:ln>
+            <a:tailEnd type="triangle"/>
+          </a:ln>
+        </p:spPr>
+        <p:style>
+          <a:lnRef idx="1">
+            <a:schemeClr val="accent1"/>
+          </a:lnRef>
+          <a:fillRef idx="0">
+            <a:schemeClr val="accent1"/>
+          </a:fillRef>
+          <a:effectRef idx="0">
+            <a:schemeClr val="accent1"/>
+          </a:effectRef>
+          <a:fontRef idx="minor">
+            <a:schemeClr val="tx1"/>
+          </a:fontRef>
+        </p:style>
+      </p:cxnSp>
+      <p:cxnSp>
+        <p:nvCxnSpPr>
+          <p:cNvPr id="163" name="Gerade Verbindung mit Pfeil 162">
+            <a:extLst>
+              <a:ext uri="{FF2B5EF4-FFF2-40B4-BE49-F238E27FC236}">
+                <a16:creationId xmlns:a16="http://schemas.microsoft.com/office/drawing/2014/main" id="{86305ED6-E89D-CEC5-C8DE-D43D2BC374AC}"/>
+              </a:ext>
+            </a:extLst>
+          </p:cNvPr>
+          <p:cNvCxnSpPr>
+            <a:cxnSpLocks/>
+            <a:stCxn id="82" idx="2"/>
+            <a:endCxn id="120" idx="0"/>
+          </p:cNvCxnSpPr>
+          <p:nvPr/>
+        </p:nvCxnSpPr>
+        <p:spPr>
+          <a:xfrm flipH="1">
+            <a:off x="10468852" y="1259047"/>
+            <a:ext cx="57144" cy="499043"/>
+          </a:xfrm>
+          <a:prstGeom prst="straightConnector1">
+            <a:avLst/>
+          </a:prstGeom>
+          <a:ln>
+            <a:tailEnd type="triangle"/>
+          </a:ln>
+        </p:spPr>
+        <p:style>
+          <a:lnRef idx="1">
+            <a:schemeClr val="accent1"/>
+          </a:lnRef>
+          <a:fillRef idx="0">
+            <a:schemeClr val="accent1"/>
+          </a:fillRef>
+          <a:effectRef idx="0">
+            <a:schemeClr val="accent1"/>
+          </a:effectRef>
+          <a:fontRef idx="minor">
+            <a:schemeClr val="tx1"/>
+          </a:fontRef>
+        </p:style>
+      </p:cxnSp>
+      <p:cxnSp>
+        <p:nvCxnSpPr>
+          <p:cNvPr id="197" name="Gerade Verbindung mit Pfeil 196">
+            <a:extLst>
+              <a:ext uri="{FF2B5EF4-FFF2-40B4-BE49-F238E27FC236}">
+                <a16:creationId xmlns:a16="http://schemas.microsoft.com/office/drawing/2014/main" id="{D8D7F948-9EBD-6730-DF0D-24EEAFEAC0BE}"/>
+              </a:ext>
+            </a:extLst>
+          </p:cNvPr>
+          <p:cNvCxnSpPr>
+            <a:cxnSpLocks/>
+            <a:endCxn id="30" idx="0"/>
+          </p:cNvCxnSpPr>
+          <p:nvPr/>
+        </p:nvCxnSpPr>
+        <p:spPr>
+          <a:xfrm flipH="1">
+            <a:off x="3516695" y="761928"/>
+            <a:ext cx="1591671" cy="1317115"/>
+          </a:xfrm>
+          <a:prstGeom prst="straightConnector1">
+            <a:avLst/>
+          </a:prstGeom>
+          <a:ln>
+            <a:tailEnd type="triangle"/>
+          </a:ln>
+        </p:spPr>
+        <p:style>
+          <a:lnRef idx="1">
+            <a:schemeClr val="accent1"/>
+          </a:lnRef>
+          <a:fillRef idx="0">
+            <a:schemeClr val="accent1"/>
+          </a:fillRef>
+          <a:effectRef idx="0">
+            <a:schemeClr val="accent1"/>
+          </a:effectRef>
+          <a:fontRef idx="minor">
+            <a:schemeClr val="tx1"/>
+          </a:fontRef>
+        </p:style>
+      </p:cxnSp>
+      <p:cxnSp>
+        <p:nvCxnSpPr>
+          <p:cNvPr id="199" name="Gerade Verbindung mit Pfeil 198">
+            <a:extLst>
+              <a:ext uri="{FF2B5EF4-FFF2-40B4-BE49-F238E27FC236}">
+                <a16:creationId xmlns:a16="http://schemas.microsoft.com/office/drawing/2014/main" id="{DA34F3F9-82D1-DEDA-D4F0-38D65F4FE50E}"/>
+              </a:ext>
+            </a:extLst>
+          </p:cNvPr>
+          <p:cNvCxnSpPr>
+            <a:cxnSpLocks/>
+            <a:stCxn id="30" idx="1"/>
+            <a:endCxn id="14" idx="3"/>
+          </p:cNvCxnSpPr>
+          <p:nvPr/>
+        </p:nvCxnSpPr>
+        <p:spPr>
+          <a:xfrm flipH="1" flipV="1">
+            <a:off x="1866639" y="2162115"/>
+            <a:ext cx="1051827" cy="368394"/>
+          </a:xfrm>
+          <a:prstGeom prst="straightConnector1">
+            <a:avLst/>
+          </a:prstGeom>
+          <a:ln>
+            <a:tailEnd type="triangle"/>
+          </a:ln>
+        </p:spPr>
+        <p:style>
+          <a:lnRef idx="1">
+            <a:schemeClr val="accent1"/>
+          </a:lnRef>
+          <a:fillRef idx="0">
+            <a:schemeClr val="accent1"/>
+          </a:fillRef>
+          <a:effectRef idx="0">
+            <a:schemeClr val="accent1"/>
+          </a:effectRef>
+          <a:fontRef idx="minor">
+            <a:schemeClr val="tx1"/>
+          </a:fontRef>
+        </p:style>
+      </p:cxnSp>
+      <p:cxnSp>
+        <p:nvCxnSpPr>
+          <p:cNvPr id="204" name="Gerade Verbindung mit Pfeil 203">
+            <a:extLst>
+              <a:ext uri="{FF2B5EF4-FFF2-40B4-BE49-F238E27FC236}">
+                <a16:creationId xmlns:a16="http://schemas.microsoft.com/office/drawing/2014/main" id="{54DA7562-BF7F-CC06-0725-4213A5A03EDB}"/>
+              </a:ext>
+            </a:extLst>
+          </p:cNvPr>
+          <p:cNvCxnSpPr>
+            <a:cxnSpLocks/>
+            <a:stCxn id="3" idx="3"/>
+            <a:endCxn id="2" idx="1"/>
+          </p:cNvCxnSpPr>
+          <p:nvPr/>
+        </p:nvCxnSpPr>
+        <p:spPr>
+          <a:xfrm flipV="1">
+            <a:off x="1877392" y="5544351"/>
+            <a:ext cx="568534" cy="657"/>
+          </a:xfrm>
+          <a:prstGeom prst="straightConnector1">
+            <a:avLst/>
+          </a:prstGeom>
+          <a:ln>
+            <a:tailEnd type="triangle"/>
+          </a:ln>
+        </p:spPr>
+        <p:style>
+          <a:lnRef idx="1">
+            <a:schemeClr val="accent1"/>
+          </a:lnRef>
+          <a:fillRef idx="0">
+            <a:schemeClr val="accent1"/>
+          </a:fillRef>
+          <a:effectRef idx="0">
+            <a:schemeClr val="accent1"/>
+          </a:effectRef>
+          <a:fontRef idx="minor">
+            <a:schemeClr val="tx1"/>
+          </a:fontRef>
+        </p:style>
+      </p:cxnSp>
+      <p:sp>
+        <p:nvSpPr>
+          <p:cNvPr id="4" name="Rechteck 3">
+            <a:extLst>
+              <a:ext uri="{FF2B5EF4-FFF2-40B4-BE49-F238E27FC236}">
+                <a16:creationId xmlns:a16="http://schemas.microsoft.com/office/drawing/2014/main" id="{74C57912-408F-2951-BB63-EB10E0C863AF}"/>
+              </a:ext>
+            </a:extLst>
+          </p:cNvPr>
+          <p:cNvSpPr/>
+          <p:nvPr/>
+        </p:nvSpPr>
+        <p:spPr>
+          <a:xfrm>
+            <a:off x="10007742" y="3507520"/>
+            <a:ext cx="1445591" cy="1065089"/>
+          </a:xfrm>
+          <a:prstGeom prst="rect">
+            <a:avLst/>
+          </a:prstGeom>
+        </p:spPr>
+        <p:style>
+          <a:lnRef idx="2">
+            <a:schemeClr val="accent6"/>
+          </a:lnRef>
+          <a:fillRef idx="1">
+            <a:schemeClr val="lt1"/>
+          </a:fillRef>
+          <a:effectRef idx="0">
+            <a:schemeClr val="accent6"/>
+          </a:effectRef>
+          <a:fontRef idx="minor">
+            <a:schemeClr val="dk1"/>
+          </a:fontRef>
+        </p:style>
+        <p:txBody>
+          <a:bodyPr rtlCol="0" anchor="ctr"/>
+          <a:lstStyle/>
+          <a:p>
+            <a:pPr algn="ctr"/>
+            <a:endParaRPr lang="de-DE" dirty="0"/>
+          </a:p>
+          <a:p>
+            <a:pPr algn="ctr"/>
+            <a:r>
+              <a:rPr lang="de-DE" dirty="0"/>
+              <a:t>Analyse </a:t>
+            </a:r>
+            <a:r>
+              <a:rPr lang="de-DE" dirty="0" err="1"/>
+              <a:t>rule</a:t>
+            </a:r>
+            <a:r>
+              <a:rPr lang="de-DE" dirty="0"/>
+              <a:t> </a:t>
+            </a:r>
+            <a:r>
+              <a:rPr lang="de-DE" dirty="0" err="1"/>
+              <a:t>builder</a:t>
+            </a:r>
+            <a:endParaRPr lang="de-DE" dirty="0"/>
+          </a:p>
+          <a:p>
+            <a:pPr algn="ctr"/>
+            <a:endParaRPr lang="de-DE" dirty="0"/>
+          </a:p>
+        </p:txBody>
+      </p:sp>
+      <p:cxnSp>
+        <p:nvCxnSpPr>
+          <p:cNvPr id="11" name="Gerade Verbindung mit Pfeil 10">
+            <a:extLst>
+              <a:ext uri="{FF2B5EF4-FFF2-40B4-BE49-F238E27FC236}">
+                <a16:creationId xmlns:a16="http://schemas.microsoft.com/office/drawing/2014/main" id="{A9E49C53-C5A9-467E-67F7-6636854599CA}"/>
+              </a:ext>
+            </a:extLst>
+          </p:cNvPr>
+          <p:cNvCxnSpPr>
+            <a:cxnSpLocks/>
+            <a:stCxn id="4" idx="2"/>
+            <a:endCxn id="100" idx="0"/>
+          </p:cNvCxnSpPr>
+          <p:nvPr/>
+        </p:nvCxnSpPr>
+        <p:spPr>
+          <a:xfrm>
+            <a:off x="10730538" y="4572609"/>
+            <a:ext cx="44764" cy="565822"/>
+          </a:xfrm>
+          <a:prstGeom prst="straightConnector1">
+            <a:avLst/>
+          </a:prstGeom>
+          <a:ln>
+            <a:tailEnd type="triangle"/>
+          </a:ln>
+        </p:spPr>
+        <p:style>
+          <a:lnRef idx="1">
+            <a:schemeClr val="accent1"/>
+          </a:lnRef>
+          <a:fillRef idx="0">
+            <a:schemeClr val="accent1"/>
+          </a:fillRef>
+          <a:effectRef idx="0">
+            <a:schemeClr val="accent1"/>
+          </a:effectRef>
+          <a:fontRef idx="minor">
+            <a:schemeClr val="tx1"/>
+          </a:fontRef>
+        </p:style>
+      </p:cxnSp>
+      <p:cxnSp>
+        <p:nvCxnSpPr>
+          <p:cNvPr id="27" name="Gerade Verbindung mit Pfeil 26">
+            <a:extLst>
+              <a:ext uri="{FF2B5EF4-FFF2-40B4-BE49-F238E27FC236}">
+                <a16:creationId xmlns:a16="http://schemas.microsoft.com/office/drawing/2014/main" id="{7CCD53F8-2E83-BCD6-8658-8D86E23998A0}"/>
+              </a:ext>
+            </a:extLst>
+          </p:cNvPr>
+          <p:cNvCxnSpPr>
+            <a:cxnSpLocks/>
+            <a:stCxn id="2" idx="3"/>
+            <a:endCxn id="44" idx="1"/>
+          </p:cNvCxnSpPr>
+          <p:nvPr/>
+        </p:nvCxnSpPr>
+        <p:spPr>
+          <a:xfrm flipV="1">
+            <a:off x="4028569" y="5525476"/>
+            <a:ext cx="1156309" cy="18875"/>
+          </a:xfrm>
+          <a:prstGeom prst="straightConnector1">
+            <a:avLst/>
+          </a:prstGeom>
+          <a:ln>
+            <a:tailEnd type="triangle"/>
+          </a:ln>
+        </p:spPr>
+        <p:style>
+          <a:lnRef idx="1">
+            <a:schemeClr val="accent1"/>
+          </a:lnRef>
+          <a:fillRef idx="0">
+            <a:schemeClr val="accent1"/>
+          </a:fillRef>
+          <a:effectRef idx="0">
+            <a:schemeClr val="accent1"/>
+          </a:effectRef>
+          <a:fontRef idx="minor">
+            <a:schemeClr val="tx1"/>
+          </a:fontRef>
+        </p:style>
+      </p:cxnSp>
+      <p:cxnSp>
+        <p:nvCxnSpPr>
+          <p:cNvPr id="40" name="Gerade Verbindung mit Pfeil 39">
+            <a:extLst>
+              <a:ext uri="{FF2B5EF4-FFF2-40B4-BE49-F238E27FC236}">
+                <a16:creationId xmlns:a16="http://schemas.microsoft.com/office/drawing/2014/main" id="{9D77B0EB-5B98-D448-502D-160BE7972833}"/>
+              </a:ext>
+            </a:extLst>
+          </p:cNvPr>
+          <p:cNvCxnSpPr>
+            <a:cxnSpLocks/>
+            <a:stCxn id="128" idx="0"/>
+            <a:endCxn id="20" idx="3"/>
+          </p:cNvCxnSpPr>
+          <p:nvPr/>
+        </p:nvCxnSpPr>
+        <p:spPr>
+          <a:xfrm flipH="1" flipV="1">
+            <a:off x="7174306" y="2241593"/>
+            <a:ext cx="1425137" cy="887676"/>
+          </a:xfrm>
+          <a:prstGeom prst="straightConnector1">
+            <a:avLst/>
+          </a:prstGeom>
+          <a:ln>
+            <a:tailEnd type="triangle"/>
+          </a:ln>
+        </p:spPr>
+        <p:style>
+          <a:lnRef idx="1">
+            <a:schemeClr val="accent1"/>
+          </a:lnRef>
+          <a:fillRef idx="0">
+            <a:schemeClr val="accent1"/>
+          </a:fillRef>
+          <a:effectRef idx="0">
+            <a:schemeClr val="accent1"/>
+          </a:effectRef>
+          <a:fontRef idx="minor">
+            <a:schemeClr val="tx1"/>
+          </a:fontRef>
+        </p:style>
+      </p:cxnSp>
+      <p:sp>
+        <p:nvSpPr>
+          <p:cNvPr id="32" name="Flussdiagramm: Magnetplattenspeicher 31">
+            <a:extLst>
+              <a:ext uri="{FF2B5EF4-FFF2-40B4-BE49-F238E27FC236}">
+                <a16:creationId xmlns:a16="http://schemas.microsoft.com/office/drawing/2014/main" id="{84323946-92CD-F020-30E5-55CE6785220E}"/>
+              </a:ext>
+            </a:extLst>
+          </p:cNvPr>
+          <p:cNvSpPr/>
+          <p:nvPr/>
+        </p:nvSpPr>
+        <p:spPr>
+          <a:xfrm>
+            <a:off x="4433790" y="3617582"/>
+            <a:ext cx="983126" cy="865854"/>
+          </a:xfrm>
+          <a:prstGeom prst="flowChartMagneticDisk">
+            <a:avLst/>
+          </a:prstGeom>
+        </p:spPr>
+        <p:style>
+          <a:lnRef idx="2">
+            <a:schemeClr val="accent6"/>
+          </a:lnRef>
+          <a:fillRef idx="1">
+            <a:schemeClr val="lt1"/>
+          </a:fillRef>
+          <a:effectRef idx="0">
+            <a:schemeClr val="accent6"/>
+          </a:effectRef>
+          <a:fontRef idx="minor">
+            <a:schemeClr val="dk1"/>
+          </a:fontRef>
+        </p:style>
+        <p:txBody>
+          <a:bodyPr rtlCol="0" anchor="ctr"/>
+          <a:lstStyle/>
+          <a:p>
+            <a:pPr algn="ctr"/>
+            <a:r>
+              <a:rPr lang="de-DE" dirty="0"/>
+              <a:t>Signal DB</a:t>
+            </a:r>
+          </a:p>
+        </p:txBody>
+      </p:sp>
+      <p:sp>
+        <p:nvSpPr>
+          <p:cNvPr id="44" name="Rechteck 43">
+            <a:extLst>
+              <a:ext uri="{FF2B5EF4-FFF2-40B4-BE49-F238E27FC236}">
+                <a16:creationId xmlns:a16="http://schemas.microsoft.com/office/drawing/2014/main" id="{94685144-9530-7E9A-91F5-3136A7ABC40F}"/>
+              </a:ext>
+            </a:extLst>
+          </p:cNvPr>
+          <p:cNvSpPr/>
+          <p:nvPr/>
+        </p:nvSpPr>
+        <p:spPr>
+          <a:xfrm>
+            <a:off x="5184878" y="5087357"/>
+            <a:ext cx="1822243" cy="876238"/>
+          </a:xfrm>
+          <a:prstGeom prst="rect">
+            <a:avLst/>
+          </a:prstGeom>
+          <a:solidFill>
+            <a:srgbClr val="92D050"/>
+          </a:solidFill>
+        </p:spPr>
+        <p:style>
+          <a:lnRef idx="2">
+            <a:schemeClr val="accent6"/>
+          </a:lnRef>
+          <a:fillRef idx="1">
+            <a:schemeClr val="lt1"/>
+          </a:fillRef>
+          <a:effectRef idx="0">
+            <a:schemeClr val="accent6"/>
+          </a:effectRef>
+          <a:fontRef idx="minor">
+            <a:schemeClr val="dk1"/>
+          </a:fontRef>
+        </p:style>
+        <p:txBody>
+          <a:bodyPr rtlCol="0" anchor="ctr"/>
+          <a:lstStyle/>
+          <a:p>
+            <a:pPr algn="ctr"/>
+            <a:r>
+              <a:rPr lang="de-DE" dirty="0"/>
+              <a:t>Patient Signal</a:t>
+            </a:r>
+          </a:p>
+          <a:p>
+            <a:pPr algn="ctr"/>
+            <a:r>
+              <a:rPr lang="de-DE" dirty="0" err="1"/>
+              <a:t>Collector</a:t>
+            </a:r>
+            <a:endParaRPr lang="de-DE" dirty="0"/>
+          </a:p>
+          <a:p>
+            <a:pPr algn="ctr"/>
+            <a:r>
+              <a:rPr lang="de-DE" sz="1200" dirty="0"/>
+              <a:t>(all Signals per </a:t>
+            </a:r>
+            <a:r>
+              <a:rPr lang="de-DE" sz="1200" dirty="0" err="1"/>
+              <a:t>patient</a:t>
+            </a:r>
+            <a:r>
+              <a:rPr lang="de-DE" sz="1200" dirty="0"/>
+              <a:t>)</a:t>
+            </a:r>
+          </a:p>
+        </p:txBody>
+      </p:sp>
+      <p:sp>
+        <p:nvSpPr>
+          <p:cNvPr id="54" name="Rechteck 53">
+            <a:extLst>
+              <a:ext uri="{FF2B5EF4-FFF2-40B4-BE49-F238E27FC236}">
+                <a16:creationId xmlns:a16="http://schemas.microsoft.com/office/drawing/2014/main" id="{AD449FD3-8B2C-44FB-182E-7D32CD4DA1C6}"/>
+              </a:ext>
+            </a:extLst>
+          </p:cNvPr>
+          <p:cNvSpPr/>
+          <p:nvPr/>
+        </p:nvSpPr>
+        <p:spPr>
+          <a:xfrm>
+            <a:off x="2040790" y="3617581"/>
+            <a:ext cx="1196458" cy="902931"/>
+          </a:xfrm>
+          <a:prstGeom prst="rect">
+            <a:avLst/>
+          </a:prstGeom>
+          <a:solidFill>
+            <a:srgbClr val="92D050"/>
+          </a:solidFill>
+        </p:spPr>
+        <p:style>
+          <a:lnRef idx="2">
+            <a:schemeClr val="accent6"/>
+          </a:lnRef>
+          <a:fillRef idx="1">
+            <a:schemeClr val="lt1"/>
+          </a:fillRef>
+          <a:effectRef idx="0">
+            <a:schemeClr val="accent6"/>
+          </a:effectRef>
+          <a:fontRef idx="minor">
+            <a:schemeClr val="dk1"/>
+          </a:fontRef>
+        </p:style>
+        <p:txBody>
+          <a:bodyPr rtlCol="0" anchor="ctr"/>
+          <a:lstStyle/>
+          <a:p>
+            <a:pPr algn="ctr"/>
+            <a:r>
+              <a:rPr lang="de-DE" dirty="0" err="1"/>
+              <a:t>Sigmal</a:t>
+            </a:r>
+            <a:r>
+              <a:rPr lang="de-DE" dirty="0"/>
+              <a:t> </a:t>
+            </a:r>
+            <a:r>
+              <a:rPr lang="de-DE" dirty="0" err="1"/>
+              <a:t>Persister</a:t>
+            </a:r>
+            <a:endParaRPr lang="de-DE" dirty="0"/>
+          </a:p>
+        </p:txBody>
+      </p:sp>
+      <p:cxnSp>
+        <p:nvCxnSpPr>
+          <p:cNvPr id="55" name="Gerade Verbindung mit Pfeil 54">
+            <a:extLst>
+              <a:ext uri="{FF2B5EF4-FFF2-40B4-BE49-F238E27FC236}">
+                <a16:creationId xmlns:a16="http://schemas.microsoft.com/office/drawing/2014/main" id="{37E2C49D-91F4-954E-0EA6-D018F836A29D}"/>
+              </a:ext>
+            </a:extLst>
+          </p:cNvPr>
+          <p:cNvCxnSpPr>
+            <a:cxnSpLocks/>
+            <a:stCxn id="2" idx="0"/>
+            <a:endCxn id="54" idx="2"/>
+          </p:cNvCxnSpPr>
+          <p:nvPr/>
+        </p:nvCxnSpPr>
+        <p:spPr>
+          <a:xfrm flipH="1" flipV="1">
+            <a:off x="2639019" y="4520512"/>
+            <a:ext cx="598229" cy="463386"/>
+          </a:xfrm>
+          <a:prstGeom prst="straightConnector1">
+            <a:avLst/>
+          </a:prstGeom>
+          <a:ln>
+            <a:tailEnd type="triangle"/>
+          </a:ln>
+        </p:spPr>
+        <p:style>
+          <a:lnRef idx="1">
+            <a:schemeClr val="accent1"/>
+          </a:lnRef>
+          <a:fillRef idx="0">
+            <a:schemeClr val="accent1"/>
+          </a:fillRef>
+          <a:effectRef idx="0">
+            <a:schemeClr val="accent1"/>
+          </a:effectRef>
+          <a:fontRef idx="minor">
+            <a:schemeClr val="tx1"/>
+          </a:fontRef>
+        </p:style>
+      </p:cxnSp>
+      <p:cxnSp>
+        <p:nvCxnSpPr>
+          <p:cNvPr id="58" name="Gerade Verbindung mit Pfeil 57">
+            <a:extLst>
+              <a:ext uri="{FF2B5EF4-FFF2-40B4-BE49-F238E27FC236}">
+                <a16:creationId xmlns:a16="http://schemas.microsoft.com/office/drawing/2014/main" id="{51D708B7-5F98-0CA1-ECA3-F7D60F019697}"/>
+              </a:ext>
+            </a:extLst>
+          </p:cNvPr>
+          <p:cNvCxnSpPr>
+            <a:cxnSpLocks/>
+            <a:stCxn id="54" idx="3"/>
+            <a:endCxn id="32" idx="2"/>
+          </p:cNvCxnSpPr>
+          <p:nvPr/>
+        </p:nvCxnSpPr>
+        <p:spPr>
+          <a:xfrm flipV="1">
+            <a:off x="3237248" y="4050509"/>
+            <a:ext cx="1196542" cy="18538"/>
+          </a:xfrm>
+          <a:prstGeom prst="straightConnector1">
+            <a:avLst/>
+          </a:prstGeom>
+          <a:ln>
+            <a:tailEnd type="triangle"/>
+          </a:ln>
+        </p:spPr>
+        <p:style>
+          <a:lnRef idx="1">
+            <a:schemeClr val="accent1"/>
+          </a:lnRef>
+          <a:fillRef idx="0">
+            <a:schemeClr val="accent1"/>
+          </a:fillRef>
+          <a:effectRef idx="0">
+            <a:schemeClr val="accent1"/>
+          </a:effectRef>
+          <a:fontRef idx="minor">
+            <a:schemeClr val="tx1"/>
+          </a:fontRef>
+        </p:style>
+      </p:cxnSp>
+      <p:cxnSp>
+        <p:nvCxnSpPr>
+          <p:cNvPr id="89" name="Gerade Verbindung mit Pfeil 88">
+            <a:extLst>
+              <a:ext uri="{FF2B5EF4-FFF2-40B4-BE49-F238E27FC236}">
+                <a16:creationId xmlns:a16="http://schemas.microsoft.com/office/drawing/2014/main" id="{F79F2388-4C65-4AA4-07FF-E74092B11E4E}"/>
+              </a:ext>
+            </a:extLst>
+          </p:cNvPr>
+          <p:cNvCxnSpPr>
+            <a:cxnSpLocks/>
+            <a:stCxn id="44" idx="3"/>
+            <a:endCxn id="99" idx="1"/>
+          </p:cNvCxnSpPr>
+          <p:nvPr/>
+        </p:nvCxnSpPr>
+        <p:spPr>
+          <a:xfrm flipV="1">
+            <a:off x="7007121" y="4893756"/>
+            <a:ext cx="880454" cy="631720"/>
+          </a:xfrm>
+          <a:prstGeom prst="straightConnector1">
+            <a:avLst/>
+          </a:prstGeom>
+          <a:ln>
+            <a:tailEnd type="triangle"/>
+          </a:ln>
+        </p:spPr>
+        <p:style>
+          <a:lnRef idx="1">
+            <a:schemeClr val="accent1"/>
+          </a:lnRef>
+          <a:fillRef idx="0">
+            <a:schemeClr val="accent1"/>
+          </a:fillRef>
+          <a:effectRef idx="0">
+            <a:schemeClr val="accent1"/>
+          </a:effectRef>
+          <a:fontRef idx="minor">
+            <a:schemeClr val="tx1"/>
+          </a:fontRef>
+        </p:style>
+      </p:cxnSp>
+      <p:cxnSp>
+        <p:nvCxnSpPr>
+          <p:cNvPr id="92" name="Gerade Verbindung mit Pfeil 91">
+            <a:extLst>
+              <a:ext uri="{FF2B5EF4-FFF2-40B4-BE49-F238E27FC236}">
+                <a16:creationId xmlns:a16="http://schemas.microsoft.com/office/drawing/2014/main" id="{448AE647-FEDD-FEC0-CB81-FEB064C447BC}"/>
+              </a:ext>
+            </a:extLst>
+          </p:cNvPr>
+          <p:cNvCxnSpPr>
+            <a:cxnSpLocks/>
+            <a:stCxn id="44" idx="3"/>
+            <a:endCxn id="100" idx="1"/>
+          </p:cNvCxnSpPr>
+          <p:nvPr/>
+        </p:nvCxnSpPr>
+        <p:spPr>
+          <a:xfrm>
+            <a:off x="7007121" y="5525476"/>
+            <a:ext cx="3000621" cy="73477"/>
+          </a:xfrm>
+          <a:prstGeom prst="straightConnector1">
+            <a:avLst/>
+          </a:prstGeom>
+          <a:ln>
+            <a:tailEnd type="triangle"/>
+          </a:ln>
+        </p:spPr>
+        <p:style>
+          <a:lnRef idx="1">
+            <a:schemeClr val="accent1"/>
+          </a:lnRef>
+          <a:fillRef idx="0">
+            <a:schemeClr val="accent1"/>
+          </a:fillRef>
+          <a:effectRef idx="0">
+            <a:schemeClr val="accent1"/>
+          </a:effectRef>
+          <a:fontRef idx="minor">
+            <a:schemeClr val="tx1"/>
+          </a:fontRef>
+        </p:style>
+      </p:cxnSp>
+      <p:cxnSp>
+        <p:nvCxnSpPr>
+          <p:cNvPr id="135" name="Gerade Verbindung mit Pfeil 134">
+            <a:extLst>
+              <a:ext uri="{FF2B5EF4-FFF2-40B4-BE49-F238E27FC236}">
+                <a16:creationId xmlns:a16="http://schemas.microsoft.com/office/drawing/2014/main" id="{6B6C8C42-3B34-2D97-788E-24DBE48764B0}"/>
+              </a:ext>
+            </a:extLst>
+          </p:cNvPr>
+          <p:cNvCxnSpPr>
+            <a:cxnSpLocks/>
+            <a:stCxn id="44" idx="0"/>
+            <a:endCxn id="20" idx="2"/>
+          </p:cNvCxnSpPr>
+          <p:nvPr/>
+        </p:nvCxnSpPr>
+        <p:spPr>
+          <a:xfrm flipV="1">
+            <a:off x="6096000" y="2741878"/>
+            <a:ext cx="55755" cy="2345479"/>
+          </a:xfrm>
+          <a:prstGeom prst="straightConnector1">
+            <a:avLst/>
+          </a:prstGeom>
+          <a:ln>
+            <a:tailEnd type="triangle"/>
+          </a:ln>
+        </p:spPr>
+        <p:style>
+          <a:lnRef idx="1">
+            <a:schemeClr val="accent1"/>
+          </a:lnRef>
+          <a:fillRef idx="0">
+            <a:schemeClr val="accent1"/>
+          </a:fillRef>
+          <a:effectRef idx="0">
+            <a:schemeClr val="accent1"/>
+          </a:effectRef>
+          <a:fontRef idx="minor">
+            <a:schemeClr val="tx1"/>
+          </a:fontRef>
+        </p:style>
+      </p:cxnSp>
+      <p:sp>
+        <p:nvSpPr>
+          <p:cNvPr id="138" name="Textfeld 137">
+            <a:extLst>
+              <a:ext uri="{FF2B5EF4-FFF2-40B4-BE49-F238E27FC236}">
+                <a16:creationId xmlns:a16="http://schemas.microsoft.com/office/drawing/2014/main" id="{749A465A-2383-5171-5F2E-1B2CD6AC8499}"/>
+              </a:ext>
+            </a:extLst>
+          </p:cNvPr>
+          <p:cNvSpPr txBox="1"/>
+          <p:nvPr/>
+        </p:nvSpPr>
+        <p:spPr>
+          <a:xfrm>
+            <a:off x="516762" y="216166"/>
+            <a:ext cx="2540682" cy="1384995"/>
+          </a:xfrm>
+          <a:prstGeom prst="rect">
+            <a:avLst/>
+          </a:prstGeom>
+          <a:noFill/>
+        </p:spPr>
+        <p:txBody>
+          <a:bodyPr wrap="square" rtlCol="0">
+            <a:spAutoFit/>
+          </a:bodyPr>
+          <a:lstStyle/>
+          <a:p>
+            <a:r>
+              <a:rPr lang="de-DE" sz="2800" b="1" dirty="0"/>
+              <a:t>Event Driven </a:t>
+            </a:r>
+          </a:p>
+          <a:p>
+            <a:r>
+              <a:rPr lang="de-DE" sz="2800" b="1" dirty="0" err="1"/>
+              <a:t>Component</a:t>
+            </a:r>
+            <a:r>
+              <a:rPr lang="de-DE" sz="2800" b="1" dirty="0"/>
+              <a:t> View</a:t>
+            </a:r>
+          </a:p>
+        </p:txBody>
+      </p:sp>
+      <p:sp>
+        <p:nvSpPr>
+          <p:cNvPr id="151" name="Rechteck 150">
+            <a:extLst>
+              <a:ext uri="{FF2B5EF4-FFF2-40B4-BE49-F238E27FC236}">
+                <a16:creationId xmlns:a16="http://schemas.microsoft.com/office/drawing/2014/main" id="{B1972254-D048-F8CF-6378-0F1B7F0DF84C}"/>
+              </a:ext>
+            </a:extLst>
+          </p:cNvPr>
+          <p:cNvSpPr/>
+          <p:nvPr/>
+        </p:nvSpPr>
+        <p:spPr>
+          <a:xfrm>
+            <a:off x="525152" y="6437376"/>
+            <a:ext cx="1158142" cy="204458"/>
+          </a:xfrm>
+          <a:prstGeom prst="rect">
+            <a:avLst/>
+          </a:prstGeom>
+          <a:solidFill>
+            <a:schemeClr val="accent2"/>
+          </a:solidFill>
+        </p:spPr>
+        <p:style>
+          <a:lnRef idx="2">
+            <a:schemeClr val="accent6"/>
+          </a:lnRef>
+          <a:fillRef idx="1">
+            <a:schemeClr val="lt1"/>
+          </a:fillRef>
+          <a:effectRef idx="0">
+            <a:schemeClr val="accent6"/>
+          </a:effectRef>
+          <a:fontRef idx="minor">
+            <a:schemeClr val="dk1"/>
+          </a:fontRef>
+        </p:style>
+        <p:txBody>
+          <a:bodyPr rtlCol="0" anchor="ctr"/>
+          <a:lstStyle/>
+          <a:p>
+            <a:pPr algn="ctr"/>
+            <a:r>
+              <a:rPr lang="de-DE" sz="1200" dirty="0"/>
+              <a:t>Event </a:t>
+            </a:r>
+            <a:r>
+              <a:rPr lang="de-DE" sz="1200" dirty="0" err="1"/>
+              <a:t>producer</a:t>
+            </a:r>
+            <a:endParaRPr lang="de-DE" sz="1200" dirty="0"/>
+          </a:p>
+        </p:txBody>
+      </p:sp>
+      <p:sp>
+        <p:nvSpPr>
+          <p:cNvPr id="152" name="Rechteck 151">
+            <a:extLst>
+              <a:ext uri="{FF2B5EF4-FFF2-40B4-BE49-F238E27FC236}">
+                <a16:creationId xmlns:a16="http://schemas.microsoft.com/office/drawing/2014/main" id="{F2F16A4F-4387-2721-B146-BF9AEF831383}"/>
+              </a:ext>
+            </a:extLst>
+          </p:cNvPr>
+          <p:cNvSpPr/>
+          <p:nvPr/>
+        </p:nvSpPr>
+        <p:spPr>
+          <a:xfrm>
+            <a:off x="2040789" y="6425183"/>
+            <a:ext cx="1582643" cy="234809"/>
+          </a:xfrm>
+          <a:prstGeom prst="rect">
+            <a:avLst/>
+          </a:prstGeom>
+          <a:solidFill>
+            <a:schemeClr val="bg1">
+              <a:lumMod val="85000"/>
+            </a:schemeClr>
+          </a:solidFill>
+        </p:spPr>
+        <p:style>
+          <a:lnRef idx="2">
+            <a:schemeClr val="accent6"/>
+          </a:lnRef>
+          <a:fillRef idx="1">
+            <a:schemeClr val="lt1"/>
+          </a:fillRef>
+          <a:effectRef idx="0">
+            <a:schemeClr val="accent6"/>
+          </a:effectRef>
+          <a:fontRef idx="minor">
+            <a:schemeClr val="dk1"/>
+          </a:fontRef>
+        </p:style>
+        <p:txBody>
+          <a:bodyPr rtlCol="0" anchor="ctr"/>
+          <a:lstStyle/>
+          <a:p>
+            <a:pPr algn="ctr"/>
+            <a:r>
+              <a:rPr lang="de-DE" sz="1200" dirty="0"/>
+              <a:t>Event Channel/Queue</a:t>
+            </a:r>
+          </a:p>
+        </p:txBody>
+      </p:sp>
+      <p:sp>
+        <p:nvSpPr>
+          <p:cNvPr id="153" name="Rechteck 152">
+            <a:extLst>
+              <a:ext uri="{FF2B5EF4-FFF2-40B4-BE49-F238E27FC236}">
+                <a16:creationId xmlns:a16="http://schemas.microsoft.com/office/drawing/2014/main" id="{C55AEC58-8540-2A12-8310-3C23AE89636D}"/>
+              </a:ext>
+            </a:extLst>
+          </p:cNvPr>
+          <p:cNvSpPr/>
+          <p:nvPr/>
+        </p:nvSpPr>
+        <p:spPr>
+          <a:xfrm>
+            <a:off x="3968186" y="6426467"/>
+            <a:ext cx="1582643" cy="234809"/>
+          </a:xfrm>
+          <a:prstGeom prst="rect">
+            <a:avLst/>
+          </a:prstGeom>
+          <a:solidFill>
+            <a:srgbClr val="92D050"/>
+          </a:solidFill>
+        </p:spPr>
+        <p:style>
+          <a:lnRef idx="2">
+            <a:schemeClr val="accent6"/>
+          </a:lnRef>
+          <a:fillRef idx="1">
+            <a:schemeClr val="lt1"/>
+          </a:fillRef>
+          <a:effectRef idx="0">
+            <a:schemeClr val="accent6"/>
+          </a:effectRef>
+          <a:fontRef idx="minor">
+            <a:schemeClr val="dk1"/>
+          </a:fontRef>
+        </p:style>
+        <p:txBody>
+          <a:bodyPr rtlCol="0" anchor="ctr"/>
+          <a:lstStyle/>
+          <a:p>
+            <a:pPr algn="ctr"/>
+            <a:r>
+              <a:rPr lang="de-DE" sz="1200" dirty="0"/>
+              <a:t>Event Consumer</a:t>
+            </a:r>
+          </a:p>
+        </p:txBody>
+      </p:sp>
+      <p:sp>
+        <p:nvSpPr>
+          <p:cNvPr id="154" name="Rechteck 153">
+            <a:extLst>
+              <a:ext uri="{FF2B5EF4-FFF2-40B4-BE49-F238E27FC236}">
+                <a16:creationId xmlns:a16="http://schemas.microsoft.com/office/drawing/2014/main" id="{380B8213-EBE5-2CEB-2449-4BA4E4E51649}"/>
+              </a:ext>
+            </a:extLst>
+          </p:cNvPr>
+          <p:cNvSpPr/>
+          <p:nvPr/>
+        </p:nvSpPr>
+        <p:spPr>
+          <a:xfrm>
+            <a:off x="5849851" y="6425055"/>
+            <a:ext cx="1582643" cy="234809"/>
+          </a:xfrm>
+          <a:prstGeom prst="rect">
+            <a:avLst/>
+          </a:prstGeom>
+          <a:noFill/>
+        </p:spPr>
+        <p:style>
+          <a:lnRef idx="2">
+            <a:schemeClr val="accent6"/>
+          </a:lnRef>
+          <a:fillRef idx="1">
+            <a:schemeClr val="lt1"/>
+          </a:fillRef>
+          <a:effectRef idx="0">
+            <a:schemeClr val="accent6"/>
+          </a:effectRef>
+          <a:fontRef idx="minor">
+            <a:schemeClr val="dk1"/>
+          </a:fontRef>
+        </p:style>
+        <p:txBody>
+          <a:bodyPr rtlCol="0" anchor="ctr"/>
+          <a:lstStyle/>
+          <a:p>
+            <a:pPr algn="ctr"/>
+            <a:r>
+              <a:rPr lang="de-DE" sz="1200" dirty="0"/>
+              <a:t>Microservice</a:t>
+            </a:r>
+          </a:p>
+        </p:txBody>
+      </p:sp>
+    </p:spTree>
+    <p:extLst>
+      <p:ext uri="{BB962C8B-B14F-4D97-AF65-F5344CB8AC3E}">
+        <p14:creationId xmlns:p14="http://schemas.microsoft.com/office/powerpoint/2010/main" val="200610175"/>
+      </p:ext>
+    </p:extLst>
+  </p:cSld>
+  <p:clrMapOvr>
+    <a:masterClrMapping/>
+  </p:clrMapOvr>
+</p:sld>
+</file>
+
+<file path=ppt/slides/slide4.xml><?xml version="1.0" encoding="utf-8"?>
+<p:sld xmlns:a="http://schemas.openxmlformats.org/drawingml/2006/main" xmlns:r="http://schemas.openxmlformats.org/officeDocument/2006/relationships" xmlns:p="http://schemas.openxmlformats.org/presentationml/2006/main">
+  <p:cSld>
+    <p:spTree>
+      <p:nvGrpSpPr>
+        <p:cNvPr id="1" name=""/>
+        <p:cNvGrpSpPr/>
+        <p:nvPr/>
+      </p:nvGrpSpPr>
+      <p:grpSpPr>
+        <a:xfrm>
+          <a:off x="0" y="0"/>
+          <a:ext cx="0" cy="0"/>
+          <a:chOff x="0" y="0"/>
+          <a:chExt cx="0" cy="0"/>
+        </a:xfrm>
+      </p:grpSpPr>
       <p:pic>
         <p:nvPicPr>
           <p:cNvPr id="5" name="Grafik 4" descr="Ein Bild, das Text, Screenshot, Design enthält.&#10;&#10;Automatisch generierte Beschreibung">
@@ -5410,7 +7642,7 @@
 </p:sld>
 </file>
 
-<file path=ppt/slides/slide4.xml><?xml version="1.0" encoding="utf-8"?>
+<file path=ppt/slides/slide5.xml><?xml version="1.0" encoding="utf-8"?>
 <p:sld xmlns:a="http://schemas.openxmlformats.org/drawingml/2006/main" xmlns:r="http://schemas.openxmlformats.org/officeDocument/2006/relationships" xmlns:p="http://schemas.openxmlformats.org/presentationml/2006/main">
   <p:cSld>
     <p:spTree>

</xml_diff>

<commit_message>
rearranged slides, fixed small error, added use cases
</commit_message>
<xml_diff>
--- a/diagrams/MonitorMe_Design.pptx
+++ b/diagrams/MonitorMe_Design.pptx
@@ -5,11 +5,13 @@
     <p:sldMasterId id="2147483648" r:id="rId1"/>
   </p:sldMasterIdLst>
   <p:sldIdLst>
-    <p:sldId id="257" r:id="rId2"/>
-    <p:sldId id="259" r:id="rId3"/>
-    <p:sldId id="261" r:id="rId4"/>
-    <p:sldId id="260" r:id="rId5"/>
-    <p:sldId id="258" r:id="rId6"/>
+    <p:sldId id="258" r:id="rId2"/>
+    <p:sldId id="260" r:id="rId3"/>
+    <p:sldId id="259" r:id="rId4"/>
+    <p:sldId id="261" r:id="rId5"/>
+    <p:sldId id="257" r:id="rId6"/>
+    <p:sldId id="262" r:id="rId7"/>
+    <p:sldId id="263" r:id="rId8"/>
   </p:sldIdLst>
   <p:sldSz cx="12192000" cy="6858000"/>
   <p:notesSz cx="6858000" cy="9144000"/>
@@ -263,7 +265,7 @@
           <a:p>
             <a:fld id="{DC6A368C-0D68-4D55-B659-220BEA3BD029}" type="datetimeFigureOut">
               <a:rPr lang="de-DE" smtClean="0"/>
-              <a:t>19.02.2024</a:t>
+              <a:t>20.02.24</a:t>
             </a:fld>
             <a:endParaRPr lang="de-DE"/>
           </a:p>
@@ -317,7 +319,7 @@
           <a:p>
             <a:fld id="{F3C0F4F0-48FD-48F1-AD45-BCD6A17CC00B}" type="slidenum">
               <a:rPr lang="de-DE" smtClean="0"/>
-              <a:t>‹Nr.›</a:t>
+              <a:t>‹#›</a:t>
             </a:fld>
             <a:endParaRPr lang="de-DE"/>
           </a:p>
@@ -461,7 +463,7 @@
           <a:p>
             <a:fld id="{DC6A368C-0D68-4D55-B659-220BEA3BD029}" type="datetimeFigureOut">
               <a:rPr lang="de-DE" smtClean="0"/>
-              <a:t>19.02.2024</a:t>
+              <a:t>20.02.24</a:t>
             </a:fld>
             <a:endParaRPr lang="de-DE"/>
           </a:p>
@@ -515,7 +517,7 @@
           <a:p>
             <a:fld id="{F3C0F4F0-48FD-48F1-AD45-BCD6A17CC00B}" type="slidenum">
               <a:rPr lang="de-DE" smtClean="0"/>
-              <a:t>‹Nr.›</a:t>
+              <a:t>‹#›</a:t>
             </a:fld>
             <a:endParaRPr lang="de-DE"/>
           </a:p>
@@ -669,7 +671,7 @@
           <a:p>
             <a:fld id="{DC6A368C-0D68-4D55-B659-220BEA3BD029}" type="datetimeFigureOut">
               <a:rPr lang="de-DE" smtClean="0"/>
-              <a:t>19.02.2024</a:t>
+              <a:t>20.02.24</a:t>
             </a:fld>
             <a:endParaRPr lang="de-DE"/>
           </a:p>
@@ -723,7 +725,7 @@
           <a:p>
             <a:fld id="{F3C0F4F0-48FD-48F1-AD45-BCD6A17CC00B}" type="slidenum">
               <a:rPr lang="de-DE" smtClean="0"/>
-              <a:t>‹Nr.›</a:t>
+              <a:t>‹#›</a:t>
             </a:fld>
             <a:endParaRPr lang="de-DE"/>
           </a:p>
@@ -867,7 +869,7 @@
           <a:p>
             <a:fld id="{DC6A368C-0D68-4D55-B659-220BEA3BD029}" type="datetimeFigureOut">
               <a:rPr lang="de-DE" smtClean="0"/>
-              <a:t>19.02.2024</a:t>
+              <a:t>20.02.24</a:t>
             </a:fld>
             <a:endParaRPr lang="de-DE"/>
           </a:p>
@@ -921,7 +923,7 @@
           <a:p>
             <a:fld id="{F3C0F4F0-48FD-48F1-AD45-BCD6A17CC00B}" type="slidenum">
               <a:rPr lang="de-DE" smtClean="0"/>
-              <a:t>‹Nr.›</a:t>
+              <a:t>‹#›</a:t>
             </a:fld>
             <a:endParaRPr lang="de-DE"/>
           </a:p>
@@ -1142,7 +1144,7 @@
           <a:p>
             <a:fld id="{DC6A368C-0D68-4D55-B659-220BEA3BD029}" type="datetimeFigureOut">
               <a:rPr lang="de-DE" smtClean="0"/>
-              <a:t>19.02.2024</a:t>
+              <a:t>20.02.24</a:t>
             </a:fld>
             <a:endParaRPr lang="de-DE"/>
           </a:p>
@@ -1196,7 +1198,7 @@
           <a:p>
             <a:fld id="{F3C0F4F0-48FD-48F1-AD45-BCD6A17CC00B}" type="slidenum">
               <a:rPr lang="de-DE" smtClean="0"/>
-              <a:t>‹Nr.›</a:t>
+              <a:t>‹#›</a:t>
             </a:fld>
             <a:endParaRPr lang="de-DE"/>
           </a:p>
@@ -1407,7 +1409,7 @@
           <a:p>
             <a:fld id="{DC6A368C-0D68-4D55-B659-220BEA3BD029}" type="datetimeFigureOut">
               <a:rPr lang="de-DE" smtClean="0"/>
-              <a:t>19.02.2024</a:t>
+              <a:t>20.02.24</a:t>
             </a:fld>
             <a:endParaRPr lang="de-DE"/>
           </a:p>
@@ -1461,7 +1463,7 @@
           <a:p>
             <a:fld id="{F3C0F4F0-48FD-48F1-AD45-BCD6A17CC00B}" type="slidenum">
               <a:rPr lang="de-DE" smtClean="0"/>
-              <a:t>‹Nr.›</a:t>
+              <a:t>‹#›</a:t>
             </a:fld>
             <a:endParaRPr lang="de-DE"/>
           </a:p>
@@ -1819,7 +1821,7 @@
           <a:p>
             <a:fld id="{DC6A368C-0D68-4D55-B659-220BEA3BD029}" type="datetimeFigureOut">
               <a:rPr lang="de-DE" smtClean="0"/>
-              <a:t>19.02.2024</a:t>
+              <a:t>20.02.24</a:t>
             </a:fld>
             <a:endParaRPr lang="de-DE"/>
           </a:p>
@@ -1873,7 +1875,7 @@
           <a:p>
             <a:fld id="{F3C0F4F0-48FD-48F1-AD45-BCD6A17CC00B}" type="slidenum">
               <a:rPr lang="de-DE" smtClean="0"/>
-              <a:t>‹Nr.›</a:t>
+              <a:t>‹#›</a:t>
             </a:fld>
             <a:endParaRPr lang="de-DE"/>
           </a:p>
@@ -1960,7 +1962,7 @@
           <a:p>
             <a:fld id="{DC6A368C-0D68-4D55-B659-220BEA3BD029}" type="datetimeFigureOut">
               <a:rPr lang="de-DE" smtClean="0"/>
-              <a:t>19.02.2024</a:t>
+              <a:t>20.02.24</a:t>
             </a:fld>
             <a:endParaRPr lang="de-DE"/>
           </a:p>
@@ -2014,7 +2016,7 @@
           <a:p>
             <a:fld id="{F3C0F4F0-48FD-48F1-AD45-BCD6A17CC00B}" type="slidenum">
               <a:rPr lang="de-DE" smtClean="0"/>
-              <a:t>‹Nr.›</a:t>
+              <a:t>‹#›</a:t>
             </a:fld>
             <a:endParaRPr lang="de-DE"/>
           </a:p>
@@ -2073,7 +2075,7 @@
           <a:p>
             <a:fld id="{DC6A368C-0D68-4D55-B659-220BEA3BD029}" type="datetimeFigureOut">
               <a:rPr lang="de-DE" smtClean="0"/>
-              <a:t>19.02.2024</a:t>
+              <a:t>20.02.24</a:t>
             </a:fld>
             <a:endParaRPr lang="de-DE"/>
           </a:p>
@@ -2127,7 +2129,7 @@
           <a:p>
             <a:fld id="{F3C0F4F0-48FD-48F1-AD45-BCD6A17CC00B}" type="slidenum">
               <a:rPr lang="de-DE" smtClean="0"/>
-              <a:t>‹Nr.›</a:t>
+              <a:t>‹#›</a:t>
             </a:fld>
             <a:endParaRPr lang="de-DE"/>
           </a:p>
@@ -2384,7 +2386,7 @@
           <a:p>
             <a:fld id="{DC6A368C-0D68-4D55-B659-220BEA3BD029}" type="datetimeFigureOut">
               <a:rPr lang="de-DE" smtClean="0"/>
-              <a:t>19.02.2024</a:t>
+              <a:t>20.02.24</a:t>
             </a:fld>
             <a:endParaRPr lang="de-DE"/>
           </a:p>
@@ -2438,7 +2440,7 @@
           <a:p>
             <a:fld id="{F3C0F4F0-48FD-48F1-AD45-BCD6A17CC00B}" type="slidenum">
               <a:rPr lang="de-DE" smtClean="0"/>
-              <a:t>‹Nr.›</a:t>
+              <a:t>‹#›</a:t>
             </a:fld>
             <a:endParaRPr lang="de-DE"/>
           </a:p>
@@ -2672,7 +2674,7 @@
           <a:p>
             <a:fld id="{DC6A368C-0D68-4D55-B659-220BEA3BD029}" type="datetimeFigureOut">
               <a:rPr lang="de-DE" smtClean="0"/>
-              <a:t>19.02.2024</a:t>
+              <a:t>20.02.24</a:t>
             </a:fld>
             <a:endParaRPr lang="de-DE"/>
           </a:p>
@@ -2726,7 +2728,7 @@
           <a:p>
             <a:fld id="{F3C0F4F0-48FD-48F1-AD45-BCD6A17CC00B}" type="slidenum">
               <a:rPr lang="de-DE" smtClean="0"/>
-              <a:t>‹Nr.›</a:t>
+              <a:t>‹#›</a:t>
             </a:fld>
             <a:endParaRPr lang="de-DE"/>
           </a:p>
@@ -2913,7 +2915,7 @@
           <a:p>
             <a:fld id="{DC6A368C-0D68-4D55-B659-220BEA3BD029}" type="datetimeFigureOut">
               <a:rPr lang="de-DE" smtClean="0"/>
-              <a:t>19.02.2024</a:t>
+              <a:t>20.02.24</a:t>
             </a:fld>
             <a:endParaRPr lang="de-DE"/>
           </a:p>
@@ -3003,7 +3005,7 @@
           <a:p>
             <a:fld id="{F3C0F4F0-48FD-48F1-AD45-BCD6A17CC00B}" type="slidenum">
               <a:rPr lang="de-DE" smtClean="0"/>
-              <a:t>‹Nr.›</a:t>
+              <a:t>‹#›</a:t>
             </a:fld>
             <a:endParaRPr lang="de-DE"/>
           </a:p>
@@ -3332,10 +3334,10 @@
       </p:grpSpPr>
       <p:pic>
         <p:nvPicPr>
-          <p:cNvPr id="5" name="Grafik 4" descr="Ein Bild, das Text, Screenshot, Design enthält.&#10;&#10;Automatisch generierte Beschreibung">
-            <a:extLst>
-              <a:ext uri="{FF2B5EF4-FFF2-40B4-BE49-F238E27FC236}">
-                <a16:creationId xmlns:a16="http://schemas.microsoft.com/office/drawing/2014/main" id="{E311F0FD-0BFE-9290-461D-14B7422D084E}"/>
+          <p:cNvPr id="3" name="Grafik 2" descr="Ein Bild, das Screenshot, Text enthält.&#10;&#10;Automatisch generierte Beschreibung">
+            <a:extLst>
+              <a:ext uri="{FF2B5EF4-FFF2-40B4-BE49-F238E27FC236}">
+                <a16:creationId xmlns:a16="http://schemas.microsoft.com/office/drawing/2014/main" id="{77F4BD91-FB29-AE0F-7769-D3E1AAE52EE1}"/>
               </a:ext>
             </a:extLst>
           </p:cNvPr>
@@ -3358,8 +3360,8 @@
         </p:blipFill>
         <p:spPr>
           <a:xfrm>
-            <a:off x="2562225" y="933450"/>
-            <a:ext cx="7067550" cy="4991100"/>
+            <a:off x="2852737" y="933450"/>
+            <a:ext cx="6486525" cy="4991100"/>
           </a:xfrm>
           <a:prstGeom prst="rect">
             <a:avLst/>
@@ -3369,7 +3371,7 @@
     </p:spTree>
     <p:extLst>
       <p:ext uri="{BB962C8B-B14F-4D97-AF65-F5344CB8AC3E}">
-        <p14:creationId xmlns:p14="http://schemas.microsoft.com/office/powerpoint/2010/main" val="1039144760"/>
+        <p14:creationId xmlns:p14="http://schemas.microsoft.com/office/powerpoint/2010/main" val="2376528082"/>
       </p:ext>
     </p:extLst>
   </p:cSld>
@@ -3380,6 +3382,72 @@
 </file>
 
 <file path=ppt/slides/slide2.xml><?xml version="1.0" encoding="utf-8"?>
+<p:sld xmlns:a="http://schemas.openxmlformats.org/drawingml/2006/main" xmlns:r="http://schemas.openxmlformats.org/officeDocument/2006/relationships" xmlns:p="http://schemas.openxmlformats.org/presentationml/2006/main">
+  <p:cSld>
+    <p:spTree>
+      <p:nvGrpSpPr>
+        <p:cNvPr id="1" name=""/>
+        <p:cNvGrpSpPr/>
+        <p:nvPr/>
+      </p:nvGrpSpPr>
+      <p:grpSpPr>
+        <a:xfrm>
+          <a:off x="0" y="0"/>
+          <a:ext cx="0" cy="0"/>
+          <a:chOff x="0" y="0"/>
+          <a:chExt cx="0" cy="0"/>
+        </a:xfrm>
+      </p:grpSpPr>
+      <p:pic>
+        <p:nvPicPr>
+          <p:cNvPr id="3" name="Picture 2" descr="A diagram of a device&#10;&#10;Description automatically generated">
+            <a:extLst>
+              <a:ext uri="{FF2B5EF4-FFF2-40B4-BE49-F238E27FC236}">
+                <a16:creationId xmlns:a16="http://schemas.microsoft.com/office/drawing/2014/main" id="{DBDA9182-43A6-5D46-96C1-96538C8B8497}"/>
+              </a:ext>
+            </a:extLst>
+          </p:cNvPr>
+          <p:cNvPicPr>
+            <a:picLocks noChangeAspect="1"/>
+          </p:cNvPicPr>
+          <p:nvPr/>
+        </p:nvPicPr>
+        <p:blipFill>
+          <a:blip r:embed="rId2">
+            <a:extLst>
+              <a:ext uri="{28A0092B-C50C-407E-A947-70E740481C1C}">
+                <a14:useLocalDpi xmlns:a14="http://schemas.microsoft.com/office/drawing/2010/main" val="0"/>
+              </a:ext>
+            </a:extLst>
+          </a:blip>
+          <a:stretch>
+            <a:fillRect/>
+          </a:stretch>
+        </p:blipFill>
+        <p:spPr>
+          <a:xfrm>
+            <a:off x="1915160" y="540512"/>
+            <a:ext cx="7772400" cy="5415874"/>
+          </a:xfrm>
+          <a:prstGeom prst="rect">
+            <a:avLst/>
+          </a:prstGeom>
+        </p:spPr>
+      </p:pic>
+    </p:spTree>
+    <p:extLst>
+      <p:ext uri="{BB962C8B-B14F-4D97-AF65-F5344CB8AC3E}">
+        <p14:creationId xmlns:p14="http://schemas.microsoft.com/office/powerpoint/2010/main" val="2732155103"/>
+      </p:ext>
+    </p:extLst>
+  </p:cSld>
+  <p:clrMapOvr>
+    <a:masterClrMapping/>
+  </p:clrMapOvr>
+</p:sld>
+</file>
+
+<file path=ppt/slides/slide3.xml><?xml version="1.0" encoding="utf-8"?>
 <p:sld xmlns:a="http://schemas.openxmlformats.org/drawingml/2006/main" xmlns:r="http://schemas.openxmlformats.org/officeDocument/2006/relationships" xmlns:p="http://schemas.openxmlformats.org/presentationml/2006/main">
   <p:cSld>
     <p:spTree>
@@ -5384,7 +5452,7 @@
 </p:sld>
 </file>
 
-<file path=ppt/slides/slide3.xml><?xml version="1.0" encoding="utf-8"?>
+<file path=ppt/slides/slide4.xml><?xml version="1.0" encoding="utf-8"?>
 <p:sld xmlns:a="http://schemas.openxmlformats.org/drawingml/2006/main" xmlns:r="http://schemas.openxmlformats.org/officeDocument/2006/relationships" xmlns:p="http://schemas.openxmlformats.org/presentationml/2006/main">
   <p:cSld>
     <p:spTree>
@@ -7576,72 +7644,6 @@
 </p:sld>
 </file>
 
-<file path=ppt/slides/slide4.xml><?xml version="1.0" encoding="utf-8"?>
-<p:sld xmlns:a="http://schemas.openxmlformats.org/drawingml/2006/main" xmlns:r="http://schemas.openxmlformats.org/officeDocument/2006/relationships" xmlns:p="http://schemas.openxmlformats.org/presentationml/2006/main">
-  <p:cSld>
-    <p:spTree>
-      <p:nvGrpSpPr>
-        <p:cNvPr id="1" name=""/>
-        <p:cNvGrpSpPr/>
-        <p:nvPr/>
-      </p:nvGrpSpPr>
-      <p:grpSpPr>
-        <a:xfrm>
-          <a:off x="0" y="0"/>
-          <a:ext cx="0" cy="0"/>
-          <a:chOff x="0" y="0"/>
-          <a:chExt cx="0" cy="0"/>
-        </a:xfrm>
-      </p:grpSpPr>
-      <p:pic>
-        <p:nvPicPr>
-          <p:cNvPr id="5" name="Grafik 4" descr="Ein Bild, das Text, Screenshot, Design enthält.&#10;&#10;Automatisch generierte Beschreibung">
-            <a:extLst>
-              <a:ext uri="{FF2B5EF4-FFF2-40B4-BE49-F238E27FC236}">
-                <a16:creationId xmlns:a16="http://schemas.microsoft.com/office/drawing/2014/main" id="{E311F0FD-0BFE-9290-461D-14B7422D084E}"/>
-              </a:ext>
-            </a:extLst>
-          </p:cNvPr>
-          <p:cNvPicPr>
-            <a:picLocks noChangeAspect="1"/>
-          </p:cNvPicPr>
-          <p:nvPr/>
-        </p:nvPicPr>
-        <p:blipFill>
-          <a:blip r:embed="rId2">
-            <a:extLst>
-              <a:ext uri="{28A0092B-C50C-407E-A947-70E740481C1C}">
-                <a14:useLocalDpi xmlns:a14="http://schemas.microsoft.com/office/drawing/2010/main" val="0"/>
-              </a:ext>
-            </a:extLst>
-          </a:blip>
-          <a:stretch>
-            <a:fillRect/>
-          </a:stretch>
-        </p:blipFill>
-        <p:spPr>
-          <a:xfrm>
-            <a:off x="2562225" y="933450"/>
-            <a:ext cx="7067550" cy="4991100"/>
-          </a:xfrm>
-          <a:prstGeom prst="rect">
-            <a:avLst/>
-          </a:prstGeom>
-        </p:spPr>
-      </p:pic>
-    </p:spTree>
-    <p:extLst>
-      <p:ext uri="{BB962C8B-B14F-4D97-AF65-F5344CB8AC3E}">
-        <p14:creationId xmlns:p14="http://schemas.microsoft.com/office/powerpoint/2010/main" val="2732155103"/>
-      </p:ext>
-    </p:extLst>
-  </p:cSld>
-  <p:clrMapOvr>
-    <a:masterClrMapping/>
-  </p:clrMapOvr>
-</p:sld>
-</file>
-
 <file path=ppt/slides/slide5.xml><?xml version="1.0" encoding="utf-8"?>
 <p:sld xmlns:a="http://schemas.openxmlformats.org/drawingml/2006/main" xmlns:r="http://schemas.openxmlformats.org/officeDocument/2006/relationships" xmlns:p="http://schemas.openxmlformats.org/presentationml/2006/main">
   <p:cSld>
@@ -7661,10 +7663,10 @@
       </p:grpSpPr>
       <p:pic>
         <p:nvPicPr>
-          <p:cNvPr id="3" name="Grafik 2" descr="Ein Bild, das Screenshot, Text enthält.&#10;&#10;Automatisch generierte Beschreibung">
-            <a:extLst>
-              <a:ext uri="{FF2B5EF4-FFF2-40B4-BE49-F238E27FC236}">
-                <a16:creationId xmlns:a16="http://schemas.microsoft.com/office/drawing/2014/main" id="{77F4BD91-FB29-AE0F-7769-D3E1AAE52EE1}"/>
+          <p:cNvPr id="3" name="Picture 2" descr="A diagram of a computer program&#10;&#10;Description automatically generated">
+            <a:extLst>
+              <a:ext uri="{FF2B5EF4-FFF2-40B4-BE49-F238E27FC236}">
+                <a16:creationId xmlns:a16="http://schemas.microsoft.com/office/drawing/2014/main" id="{83D769F3-4387-89D7-4AD0-285402E4617F}"/>
               </a:ext>
             </a:extLst>
           </p:cNvPr>
@@ -7687,18 +7689,281 @@
         </p:blipFill>
         <p:spPr>
           <a:xfrm>
-            <a:off x="2852737" y="933450"/>
-            <a:ext cx="6486525" cy="4991100"/>
+            <a:off x="1532071" y="1353312"/>
+            <a:ext cx="7772400" cy="5103417"/>
           </a:xfrm>
           <a:prstGeom prst="rect">
             <a:avLst/>
           </a:prstGeom>
         </p:spPr>
       </p:pic>
+      <p:sp>
+        <p:nvSpPr>
+          <p:cNvPr id="4" name="Textfeld 4">
+            <a:extLst>
+              <a:ext uri="{FF2B5EF4-FFF2-40B4-BE49-F238E27FC236}">
+                <a16:creationId xmlns:a16="http://schemas.microsoft.com/office/drawing/2014/main" id="{F03912B1-8D46-72F6-D417-D1B3DD25E9D8}"/>
+              </a:ext>
+            </a:extLst>
+          </p:cNvPr>
+          <p:cNvSpPr txBox="1"/>
+          <p:nvPr/>
+        </p:nvSpPr>
+        <p:spPr>
+          <a:xfrm>
+            <a:off x="351536" y="298461"/>
+            <a:ext cx="4060599" cy="523220"/>
+          </a:xfrm>
+          <a:prstGeom prst="rect">
+            <a:avLst/>
+          </a:prstGeom>
+          <a:noFill/>
+        </p:spPr>
+        <p:txBody>
+          <a:bodyPr wrap="none" rtlCol="0">
+            <a:spAutoFit/>
+          </a:bodyPr>
+          <a:lstStyle/>
+          <a:p>
+            <a:r>
+              <a:rPr lang="de-DE" sz="2800" b="1" dirty="0"/>
+              <a:t>Use Case 01: </a:t>
+            </a:r>
+            <a:r>
+              <a:rPr lang="de-DE" sz="2800" b="1" dirty="0" err="1"/>
+              <a:t>collect</a:t>
+            </a:r>
+            <a:r>
+              <a:rPr lang="de-DE" sz="2800" b="1" dirty="0"/>
+              <a:t> </a:t>
+            </a:r>
+            <a:r>
+              <a:rPr lang="de-DE" sz="2800" b="1" dirty="0" err="1"/>
+              <a:t>signal</a:t>
+            </a:r>
+            <a:endParaRPr lang="de-DE" sz="2800" b="1" dirty="0"/>
+          </a:p>
+        </p:txBody>
+      </p:sp>
     </p:spTree>
     <p:extLst>
       <p:ext uri="{BB962C8B-B14F-4D97-AF65-F5344CB8AC3E}">
-        <p14:creationId xmlns:p14="http://schemas.microsoft.com/office/powerpoint/2010/main" val="2376528082"/>
+        <p14:creationId xmlns:p14="http://schemas.microsoft.com/office/powerpoint/2010/main" val="1039144760"/>
+      </p:ext>
+    </p:extLst>
+  </p:cSld>
+  <p:clrMapOvr>
+    <a:masterClrMapping/>
+  </p:clrMapOvr>
+</p:sld>
+</file>
+
+<file path=ppt/slides/slide6.xml><?xml version="1.0" encoding="utf-8"?>
+<p:sld xmlns:a="http://schemas.openxmlformats.org/drawingml/2006/main" xmlns:r="http://schemas.openxmlformats.org/officeDocument/2006/relationships" xmlns:p="http://schemas.openxmlformats.org/presentationml/2006/main">
+  <p:cSld>
+    <p:spTree>
+      <p:nvGrpSpPr>
+        <p:cNvPr id="1" name=""/>
+        <p:cNvGrpSpPr/>
+        <p:nvPr/>
+      </p:nvGrpSpPr>
+      <p:grpSpPr>
+        <a:xfrm>
+          <a:off x="0" y="0"/>
+          <a:ext cx="0" cy="0"/>
+          <a:chOff x="0" y="0"/>
+          <a:chExt cx="0" cy="0"/>
+        </a:xfrm>
+      </p:grpSpPr>
+      <p:pic>
+        <p:nvPicPr>
+          <p:cNvPr id="5" name="Picture 4" descr="A diagram of a data processing process&#10;&#10;Description automatically generated">
+            <a:extLst>
+              <a:ext uri="{FF2B5EF4-FFF2-40B4-BE49-F238E27FC236}">
+                <a16:creationId xmlns:a16="http://schemas.microsoft.com/office/drawing/2014/main" id="{A988E9FE-9C22-3B27-9FB1-18C37ED77297}"/>
+              </a:ext>
+            </a:extLst>
+          </p:cNvPr>
+          <p:cNvPicPr>
+            <a:picLocks noChangeAspect="1"/>
+          </p:cNvPicPr>
+          <p:nvPr/>
+        </p:nvPicPr>
+        <p:blipFill>
+          <a:blip r:embed="rId2">
+            <a:extLst>
+              <a:ext uri="{28A0092B-C50C-407E-A947-70E740481C1C}">
+                <a14:useLocalDpi xmlns:a14="http://schemas.microsoft.com/office/drawing/2010/main" val="0"/>
+              </a:ext>
+            </a:extLst>
+          </a:blip>
+          <a:stretch>
+            <a:fillRect/>
+          </a:stretch>
+        </p:blipFill>
+        <p:spPr>
+          <a:xfrm>
+            <a:off x="3278886" y="1072134"/>
+            <a:ext cx="4447794" cy="3314598"/>
+          </a:xfrm>
+          <a:prstGeom prst="rect">
+            <a:avLst/>
+          </a:prstGeom>
+        </p:spPr>
+      </p:pic>
+      <p:sp>
+        <p:nvSpPr>
+          <p:cNvPr id="6" name="Textfeld 4">
+            <a:extLst>
+              <a:ext uri="{FF2B5EF4-FFF2-40B4-BE49-F238E27FC236}">
+                <a16:creationId xmlns:a16="http://schemas.microsoft.com/office/drawing/2014/main" id="{DE6336E6-448F-EF6F-F399-30A4F86E0BA8}"/>
+              </a:ext>
+            </a:extLst>
+          </p:cNvPr>
+          <p:cNvSpPr txBox="1"/>
+          <p:nvPr/>
+        </p:nvSpPr>
+        <p:spPr>
+          <a:xfrm>
+            <a:off x="351536" y="298461"/>
+            <a:ext cx="4515339" cy="523220"/>
+          </a:xfrm>
+          <a:prstGeom prst="rect">
+            <a:avLst/>
+          </a:prstGeom>
+          <a:noFill/>
+        </p:spPr>
+        <p:txBody>
+          <a:bodyPr wrap="none" rtlCol="0">
+            <a:spAutoFit/>
+          </a:bodyPr>
+          <a:lstStyle/>
+          <a:p>
+            <a:r>
+              <a:rPr lang="de-DE" sz="2800" b="1" dirty="0"/>
+              <a:t>Use Case 02: </a:t>
+            </a:r>
+            <a:r>
+              <a:rPr lang="de-DE" sz="2800" b="1" dirty="0" err="1"/>
+              <a:t>create</a:t>
+            </a:r>
+            <a:r>
+              <a:rPr lang="de-DE" sz="2800" b="1" dirty="0"/>
+              <a:t> </a:t>
+            </a:r>
+            <a:r>
+              <a:rPr lang="de-DE" sz="2800" b="1" dirty="0" err="1"/>
+              <a:t>snapshot</a:t>
+            </a:r>
+            <a:endParaRPr lang="de-DE" sz="2800" b="1" dirty="0"/>
+          </a:p>
+        </p:txBody>
+      </p:sp>
+    </p:spTree>
+    <p:extLst>
+      <p:ext uri="{BB962C8B-B14F-4D97-AF65-F5344CB8AC3E}">
+        <p14:creationId xmlns:p14="http://schemas.microsoft.com/office/powerpoint/2010/main" val="1525347599"/>
+      </p:ext>
+    </p:extLst>
+  </p:cSld>
+  <p:clrMapOvr>
+    <a:masterClrMapping/>
+  </p:clrMapOvr>
+</p:sld>
+</file>
+
+<file path=ppt/slides/slide7.xml><?xml version="1.0" encoding="utf-8"?>
+<p:sld xmlns:a="http://schemas.openxmlformats.org/drawingml/2006/main" xmlns:r="http://schemas.openxmlformats.org/officeDocument/2006/relationships" xmlns:p="http://schemas.openxmlformats.org/presentationml/2006/main">
+  <p:cSld>
+    <p:spTree>
+      <p:nvGrpSpPr>
+        <p:cNvPr id="1" name=""/>
+        <p:cNvGrpSpPr/>
+        <p:nvPr/>
+      </p:nvGrpSpPr>
+      <p:grpSpPr>
+        <a:xfrm>
+          <a:off x="0" y="0"/>
+          <a:ext cx="0" cy="0"/>
+          <a:chOff x="0" y="0"/>
+          <a:chExt cx="0" cy="0"/>
+        </a:xfrm>
+      </p:grpSpPr>
+      <p:pic>
+        <p:nvPicPr>
+          <p:cNvPr id="3" name="Picture 2" descr="A diagram of a medical procedure&#10;&#10;Description automatically generated with medium confidence">
+            <a:extLst>
+              <a:ext uri="{FF2B5EF4-FFF2-40B4-BE49-F238E27FC236}">
+                <a16:creationId xmlns:a16="http://schemas.microsoft.com/office/drawing/2014/main" id="{76BF9777-5D10-605A-F067-9F482E15D4DA}"/>
+              </a:ext>
+            </a:extLst>
+          </p:cNvPr>
+          <p:cNvPicPr>
+            <a:picLocks noChangeAspect="1"/>
+          </p:cNvPicPr>
+          <p:nvPr/>
+        </p:nvPicPr>
+        <p:blipFill>
+          <a:blip r:embed="rId2">
+            <a:extLst>
+              <a:ext uri="{28A0092B-C50C-407E-A947-70E740481C1C}">
+                <a14:useLocalDpi xmlns:a14="http://schemas.microsoft.com/office/drawing/2010/main" val="0"/>
+              </a:ext>
+            </a:extLst>
+          </a:blip>
+          <a:stretch>
+            <a:fillRect/>
+          </a:stretch>
+        </p:blipFill>
+        <p:spPr>
+          <a:xfrm>
+            <a:off x="2276076" y="117485"/>
+            <a:ext cx="7772400" cy="6495014"/>
+          </a:xfrm>
+          <a:prstGeom prst="rect">
+            <a:avLst/>
+          </a:prstGeom>
+        </p:spPr>
+      </p:pic>
+      <p:sp>
+        <p:nvSpPr>
+          <p:cNvPr id="4" name="Textfeld 4">
+            <a:extLst>
+              <a:ext uri="{FF2B5EF4-FFF2-40B4-BE49-F238E27FC236}">
+                <a16:creationId xmlns:a16="http://schemas.microsoft.com/office/drawing/2014/main" id="{12506719-F428-85DF-1ED1-604E7C413805}"/>
+              </a:ext>
+            </a:extLst>
+          </p:cNvPr>
+          <p:cNvSpPr txBox="1"/>
+          <p:nvPr/>
+        </p:nvSpPr>
+        <p:spPr>
+          <a:xfrm>
+            <a:off x="351536" y="298461"/>
+            <a:ext cx="2845651" cy="523220"/>
+          </a:xfrm>
+          <a:prstGeom prst="rect">
+            <a:avLst/>
+          </a:prstGeom>
+          <a:noFill/>
+        </p:spPr>
+        <p:txBody>
+          <a:bodyPr wrap="none" rtlCol="0">
+            <a:spAutoFit/>
+          </a:bodyPr>
+          <a:lstStyle/>
+          <a:p>
+            <a:r>
+              <a:rPr lang="de-DE" sz="2800" b="1" dirty="0"/>
+              <a:t>Use Case 03: alert</a:t>
+            </a:r>
+          </a:p>
+        </p:txBody>
+      </p:sp>
+    </p:spTree>
+    <p:extLst>
+      <p:ext uri="{BB962C8B-B14F-4D97-AF65-F5344CB8AC3E}">
+        <p14:creationId xmlns:p14="http://schemas.microsoft.com/office/powerpoint/2010/main" val="3077531628"/>
       </p:ext>
     </p:extLst>
   </p:cSld>

</xml_diff>